<commit_message>
Added file for images from ppt
</commit_message>
<xml_diff>
--- a/ezDiffusion.pptx
+++ b/ezDiffusion.pptx
@@ -2857,7 +2857,7 @@
           <a:p>
             <a:fld id="{B56F32FC-4BD9-442A-A8C6-51598C909FE3}" type="datetimeFigureOut">
               <a:rPr lang="en-US" smtClean="0"/>
-              <a:t>3/2/2024</a:t>
+              <a:t>3/20/2024</a:t>
             </a:fld>
             <a:endParaRPr lang="en-US" dirty="0"/>
           </a:p>
@@ -3034,7 +3034,7 @@
           <a:p>
             <a:fld id="{056371FA-A98D-41E8-93F4-09945841298A}" type="datetimeFigureOut">
               <a:rPr lang="en-US" smtClean="0"/>
-              <a:t>3/2/2024</a:t>
+              <a:t>3/20/2024</a:t>
             </a:fld>
             <a:endParaRPr lang="en-US" dirty="0"/>
           </a:p>
@@ -3366,7 +3366,7 @@
           <a:p>
             <a:fld id="{22289C57-55D7-40A4-A101-E74FAC7A092B}" type="slidenum">
               <a:rPr lang="en-US" smtClean="0"/>
-              <a:t>2</a:t>
+              <a:t>1</a:t>
             </a:fld>
             <a:endParaRPr lang="en-US" dirty="0"/>
           </a:p>
@@ -3375,7 +3375,7 @@
     </p:spTree>
     <p:extLst>
       <p:ext uri="{BB962C8B-B14F-4D97-AF65-F5344CB8AC3E}">
-        <p14:creationId xmlns:p14="http://schemas.microsoft.com/office/powerpoint/2010/main" val="338238887"/>
+        <p14:creationId xmlns:p14="http://schemas.microsoft.com/office/powerpoint/2010/main" val="3005054083"/>
       </p:ext>
     </p:extLst>
   </p:cSld>
@@ -3429,10 +3429,87 @@
           <a:bodyPr/>
           <a:lstStyle/>
           <a:p>
-            <a:r>
-              <a:rPr lang="en-US" dirty="0"/>
-              <a:t>Goal to be at 10 min mark by this slide</a:t>
-            </a:r>
+            <a:pPr algn="l"/>
+            <a:endParaRPr lang="en-US" sz="1800" b="0" i="0" u="none" strike="noStrike" baseline="0" dirty="0">
+              <a:solidFill>
+                <a:srgbClr val="000000"/>
+              </a:solidFill>
+              <a:latin typeface="Calibri" panose="020F0502020204030204" pitchFamily="34" charset="0"/>
+            </a:endParaRPr>
+          </a:p>
+          <a:p>
+            <a:r>
+              <a:rPr lang="en-US" sz="1800" b="0" i="0" u="none" strike="noStrike" baseline="0" dirty="0">
+                <a:solidFill>
+                  <a:srgbClr val="000000"/>
+                </a:solidFill>
+                <a:latin typeface="Calibri" panose="020F0502020204030204" pitchFamily="34" charset="0"/>
+              </a:rPr>
+              <a:t>Discuss range of values supported by your model</a:t>
+            </a:r>
+          </a:p>
+          <a:p>
+            <a:r>
+              <a:rPr lang="en-US" sz="1800" b="0" i="0" u="none" strike="noStrike" baseline="0" dirty="0">
+                <a:solidFill>
+                  <a:srgbClr val="000000"/>
+                </a:solidFill>
+                <a:latin typeface="Arial" panose="020B0604020202020204" pitchFamily="34" charset="0"/>
+              </a:rPr>
+              <a:t>•</a:t>
+            </a:r>
+            <a:r>
+              <a:rPr lang="en-US" sz="1800" b="0" i="0" u="none" strike="noStrike" baseline="0" dirty="0">
+                <a:solidFill>
+                  <a:srgbClr val="000000"/>
+                </a:solidFill>
+                <a:latin typeface="Calibri" panose="020F0502020204030204" pitchFamily="34" charset="0"/>
+              </a:rPr>
+              <a:t>Discuss whether your priors are weak, strong or un-informative</a:t>
+            </a:r>
+          </a:p>
+          <a:p>
+            <a:r>
+              <a:rPr lang="en-US" sz="1800" b="0" i="0" u="none" strike="noStrike" baseline="0" dirty="0">
+                <a:solidFill>
+                  <a:srgbClr val="000000"/>
+                </a:solidFill>
+                <a:latin typeface="Arial" panose="020B0604020202020204" pitchFamily="34" charset="0"/>
+              </a:rPr>
+              <a:t>•</a:t>
+            </a:r>
+            <a:r>
+              <a:rPr lang="en-US" sz="1800" b="0" i="0" u="none" strike="noStrike" baseline="0" dirty="0">
+                <a:solidFill>
+                  <a:srgbClr val="000000"/>
+                </a:solidFill>
+                <a:latin typeface="Calibri" panose="020F0502020204030204" pitchFamily="34" charset="0"/>
+              </a:rPr>
+              <a:t>Discuss an implication of prior choice.</a:t>
+            </a:r>
+          </a:p>
+          <a:p>
+            <a:r>
+              <a:rPr lang="en-US" sz="1800" b="0" i="0" u="none" strike="noStrike" baseline="0" dirty="0">
+                <a:solidFill>
+                  <a:srgbClr val="000000"/>
+                </a:solidFill>
+                <a:latin typeface="Arial" panose="020B0604020202020204" pitchFamily="34" charset="0"/>
+              </a:rPr>
+              <a:t>•</a:t>
+            </a:r>
+            <a:r>
+              <a:rPr lang="en-US" sz="1800" b="0" i="0" u="none" strike="noStrike" baseline="0" dirty="0">
+                <a:solidFill>
+                  <a:srgbClr val="000000"/>
+                </a:solidFill>
+                <a:latin typeface="Calibri" panose="020F0502020204030204" pitchFamily="34" charset="0"/>
+              </a:rPr>
+              <a:t>Discuss why the pattern flipped in case of response accuracy.</a:t>
+            </a:r>
+          </a:p>
+          <a:p>
+            <a:endParaRPr lang="en-US" dirty="0"/>
           </a:p>
         </p:txBody>
       </p:sp>
@@ -3453,7 +3530,7 @@
           <a:p>
             <a:fld id="{22289C57-55D7-40A4-A101-E74FAC7A092B}" type="slidenum">
               <a:rPr lang="en-US" smtClean="0"/>
-              <a:t>17</a:t>
+              <a:t>14</a:t>
             </a:fld>
             <a:endParaRPr lang="en-US" dirty="0"/>
           </a:p>
@@ -3462,7 +3539,7 @@
     </p:spTree>
     <p:extLst>
       <p:ext uri="{BB962C8B-B14F-4D97-AF65-F5344CB8AC3E}">
-        <p14:creationId xmlns:p14="http://schemas.microsoft.com/office/powerpoint/2010/main" val="4168332215"/>
+        <p14:creationId xmlns:p14="http://schemas.microsoft.com/office/powerpoint/2010/main" val="1233011643"/>
       </p:ext>
     </p:extLst>
   </p:cSld>
@@ -3517,6 +3594,93 @@
           <a:lstStyle/>
           <a:p>
             <a:r>
+              <a:rPr lang="en-US" dirty="0"/>
+              <a:t>Goal to be at 10 min mark by this slide</a:t>
+            </a:r>
+          </a:p>
+        </p:txBody>
+      </p:sp>
+      <p:sp>
+        <p:nvSpPr>
+          <p:cNvPr id="4" name="Slide Number Placeholder 3"/>
+          <p:cNvSpPr>
+            <a:spLocks noGrp="1"/>
+          </p:cNvSpPr>
+          <p:nvPr>
+            <p:ph type="sldNum" sz="quarter" idx="5"/>
+          </p:nvPr>
+        </p:nvSpPr>
+        <p:spPr/>
+        <p:txBody>
+          <a:bodyPr/>
+          <a:lstStyle/>
+          <a:p>
+            <a:fld id="{22289C57-55D7-40A4-A101-E74FAC7A092B}" type="slidenum">
+              <a:rPr lang="en-US" smtClean="0"/>
+              <a:t>17</a:t>
+            </a:fld>
+            <a:endParaRPr lang="en-US" dirty="0"/>
+          </a:p>
+        </p:txBody>
+      </p:sp>
+    </p:spTree>
+    <p:extLst>
+      <p:ext uri="{BB962C8B-B14F-4D97-AF65-F5344CB8AC3E}">
+        <p14:creationId xmlns:p14="http://schemas.microsoft.com/office/powerpoint/2010/main" val="4168332215"/>
+      </p:ext>
+    </p:extLst>
+  </p:cSld>
+  <p:clrMapOvr>
+    <a:masterClrMapping/>
+  </p:clrMapOvr>
+</p:notes>
+</file>
+
+<file path=ppt/notesSlides/notesSlide12.xml><?xml version="1.0" encoding="utf-8"?>
+<p:notes xmlns:a="http://schemas.openxmlformats.org/drawingml/2006/main" xmlns:r="http://schemas.openxmlformats.org/officeDocument/2006/relationships" xmlns:p="http://schemas.openxmlformats.org/presentationml/2006/main">
+  <p:cSld>
+    <p:spTree>
+      <p:nvGrpSpPr>
+        <p:cNvPr id="1" name=""/>
+        <p:cNvGrpSpPr/>
+        <p:nvPr/>
+      </p:nvGrpSpPr>
+      <p:grpSpPr>
+        <a:xfrm>
+          <a:off x="0" y="0"/>
+          <a:ext cx="0" cy="0"/>
+          <a:chOff x="0" y="0"/>
+          <a:chExt cx="0" cy="0"/>
+        </a:xfrm>
+      </p:grpSpPr>
+      <p:sp>
+        <p:nvSpPr>
+          <p:cNvPr id="2" name="Slide Image Placeholder 1"/>
+          <p:cNvSpPr>
+            <a:spLocks noGrp="1" noRot="1" noChangeAspect="1"/>
+          </p:cNvSpPr>
+          <p:nvPr>
+            <p:ph type="sldImg"/>
+          </p:nvPr>
+        </p:nvSpPr>
+        <p:spPr/>
+      </p:sp>
+      <p:sp>
+        <p:nvSpPr>
+          <p:cNvPr id="3" name="Notes Placeholder 2"/>
+          <p:cNvSpPr>
+            <a:spLocks noGrp="1"/>
+          </p:cNvSpPr>
+          <p:nvPr>
+            <p:ph type="body" idx="1"/>
+          </p:nvPr>
+        </p:nvSpPr>
+        <p:spPr/>
+        <p:txBody>
+          <a:bodyPr/>
+          <a:lstStyle/>
+          <a:p>
+            <a:r>
               <a:rPr lang="en-US" sz="1200" b="0" i="0" u="none" strike="noStrike" baseline="0" dirty="0">
                 <a:solidFill>
                   <a:srgbClr val="000000"/>
@@ -3607,7 +3771,7 @@
 </p:notes>
 </file>
 
-<file path=ppt/notesSlides/notesSlide12.xml><?xml version="1.0" encoding="utf-8"?>
+<file path=ppt/notesSlides/notesSlide13.xml><?xml version="1.0" encoding="utf-8"?>
 <p:notes xmlns:a="http://schemas.openxmlformats.org/drawingml/2006/main" xmlns:r="http://schemas.openxmlformats.org/officeDocument/2006/relationships" xmlns:p="http://schemas.openxmlformats.org/presentationml/2006/main">
   <p:cSld>
     <p:spTree>
@@ -3737,88 +3901,11 @@
           <a:p>
             <a:r>
               <a:rPr lang="en-US" dirty="0"/>
-              <a:t>Participants required to view RDK and report dominant direction via mouse movements</a:t>
-            </a:r>
-          </a:p>
-          <a:p>
-            <a:r>
-              <a:rPr lang="en-US" dirty="0"/>
-              <a:t>Directly afterwards participants were asked to select number of points willing to wager that the answer chosen was correct</a:t>
-            </a:r>
-          </a:p>
-          <a:p>
-            <a:r>
-              <a:rPr lang="en-US" dirty="0"/>
-              <a:t>Coherence was manipulated</a:t>
-            </a:r>
-          </a:p>
-          <a:p>
-            <a:r>
-              <a:rPr lang="en-US" dirty="0"/>
-              <a:t>“Decision confidence” = </a:t>
-            </a:r>
-            <a:r>
-              <a:rPr lang="en-US" sz="1800" b="0" i="0" u="none" strike="noStrike" baseline="0" dirty="0">
-                <a:latin typeface="CMR12"/>
-              </a:rPr>
-              <a:t>subjective sense of certainty</a:t>
-            </a:r>
-          </a:p>
-          <a:p>
-            <a:pPr algn="l"/>
-            <a:r>
-              <a:rPr lang="en-US" sz="1800" b="0" i="0" u="none" strike="noStrike" baseline="0" dirty="0">
-                <a:latin typeface="CMR12"/>
-              </a:rPr>
-              <a:t>Motion coherence (the probability of any particular dot being displaced in the</a:t>
-            </a:r>
-          </a:p>
-          <a:p>
-            <a:pPr algn="l"/>
-            <a:r>
-              <a:rPr lang="en-US" sz="1800" b="0" i="0" u="none" strike="noStrike" baseline="0" dirty="0">
-                <a:latin typeface="CMR12"/>
-              </a:rPr>
-              <a:t>stimulus direction)</a:t>
-            </a:r>
-          </a:p>
-          <a:p>
-            <a:pPr algn="l"/>
-            <a:r>
-              <a:rPr lang="en-US" sz="1800" b="0" i="0" u="none" strike="noStrike" baseline="0" dirty="0" err="1">
-                <a:latin typeface="CMTI12"/>
-              </a:rPr>
-              <a:t>ouse</a:t>
-            </a:r>
-            <a:r>
-              <a:rPr lang="en-US" sz="1800" b="0" i="0" u="none" strike="noStrike" baseline="0" dirty="0">
-                <a:latin typeface="CMTI12"/>
-              </a:rPr>
-              <a:t> trajectory information was not predictive of post-decision</a:t>
-            </a:r>
-          </a:p>
-          <a:p>
-            <a:pPr algn="l"/>
-            <a:r>
-              <a:rPr lang="en-US" sz="1800" b="0" i="0" u="none" strike="noStrike" baseline="0" dirty="0">
-                <a:latin typeface="CMTI12"/>
-              </a:rPr>
-              <a:t>certainty but was strongly related to decision accuracy.</a:t>
-            </a:r>
-          </a:p>
-          <a:p>
-            <a:pPr algn="l"/>
-            <a:r>
-              <a:rPr lang="en-US" sz="1800" b="0" i="0" u="none" strike="noStrike" baseline="0" dirty="0">
-                <a:latin typeface="CMTI12"/>
-              </a:rPr>
-              <a:t>Result of the experiment: mouse trajectories were not indicative of confidence but were related to </a:t>
-            </a:r>
-            <a:r>
-              <a:rPr lang="en-US" sz="1800" b="0" i="0" u="none" strike="noStrike" baseline="0" dirty="0" err="1">
-                <a:latin typeface="CMTI12"/>
-              </a:rPr>
-              <a:t>accuarcy</a:t>
+              <a:t>The article from which the data used in this </a:t>
+            </a:r>
+            <a:r>
+              <a:rPr lang="en-US"/>
+              <a:t>project originates.</a:t>
             </a:r>
             <a:endParaRPr lang="en-US" dirty="0"/>
           </a:p>
@@ -3841,7 +3928,7 @@
           <a:p>
             <a:fld id="{22289C57-55D7-40A4-A101-E74FAC7A092B}" type="slidenum">
               <a:rPr lang="en-US" smtClean="0"/>
-              <a:t>3</a:t>
+              <a:t>2</a:t>
             </a:fld>
             <a:endParaRPr lang="en-US" dirty="0"/>
           </a:p>
@@ -3850,7 +3937,7 @@
     </p:spTree>
     <p:extLst>
       <p:ext uri="{BB962C8B-B14F-4D97-AF65-F5344CB8AC3E}">
-        <p14:creationId xmlns:p14="http://schemas.microsoft.com/office/powerpoint/2010/main" val="3054867290"/>
+        <p14:creationId xmlns:p14="http://schemas.microsoft.com/office/powerpoint/2010/main" val="338238887"/>
       </p:ext>
     </p:extLst>
   </p:cSld>
@@ -3905,110 +3992,90 @@
           <a:lstStyle/>
           <a:p>
             <a:r>
-              <a:rPr lang="en-US" b="0" i="0" dirty="0">
-                <a:solidFill>
-                  <a:srgbClr val="333333"/>
-                </a:solidFill>
-                <a:effectLst/>
-                <a:latin typeface="Georgia" panose="02040502050405020303" pitchFamily="18" charset="0"/>
+              <a:rPr lang="en-US" dirty="0"/>
+              <a:t>Participants required to view RDK and report dominant direction via mouse movements</a:t>
+            </a:r>
+          </a:p>
+          <a:p>
+            <a:r>
+              <a:rPr lang="en-US" dirty="0"/>
+              <a:t>Directly afterwards participants were asked to select number of points willing to wager that the answer chosen was correct</a:t>
+            </a:r>
+          </a:p>
+          <a:p>
+            <a:r>
+              <a:rPr lang="en-US" dirty="0"/>
+              <a:t>Coherence was manipulated</a:t>
+            </a:r>
+          </a:p>
+          <a:p>
+            <a:r>
+              <a:rPr lang="en-US" dirty="0"/>
+              <a:t>“Decision confidence” = </a:t>
+            </a:r>
+            <a:r>
+              <a:rPr lang="en-US" sz="1800" b="0" i="0" u="none" strike="noStrike" baseline="0" dirty="0">
+                <a:latin typeface="CMR12"/>
               </a:rPr>
-              <a:t>speed–accuracy trade-off</a:t>
-            </a:r>
-          </a:p>
-          <a:p>
-            <a:r>
-              <a:rPr lang="en-US" b="0" i="0" dirty="0">
-                <a:solidFill>
-                  <a:srgbClr val="333333"/>
-                </a:solidFill>
-                <a:effectLst/>
-                <a:latin typeface="Georgia" panose="02040502050405020303" pitchFamily="18" charset="0"/>
+              <a:t>subjective sense of certainty</a:t>
+            </a:r>
+          </a:p>
+          <a:p>
+            <a:pPr algn="l"/>
+            <a:r>
+              <a:rPr lang="en-US" sz="1800" b="0" i="0" u="none" strike="noStrike" baseline="0" dirty="0">
+                <a:latin typeface="CMR12"/>
               </a:rPr>
-              <a:t>sequential accumulator models.</a:t>
-            </a:r>
-          </a:p>
-          <a:p>
-            <a:pPr marL="0" marR="0" lvl="0" indent="0" algn="l" defTabSz="914400" rtl="0" eaLnBrk="1" fontAlgn="auto" latinLnBrk="0" hangingPunct="1">
-              <a:lnSpc>
-                <a:spcPct val="100000"/>
-              </a:lnSpc>
-              <a:spcBef>
-                <a:spcPts val="0"/>
-              </a:spcBef>
-              <a:spcAft>
-                <a:spcPts val="0"/>
-              </a:spcAft>
-              <a:buClrTx/>
-              <a:buSzTx/>
-              <a:buFontTx/>
-              <a:buNone/>
-              <a:tabLst/>
-              <a:defRPr/>
-            </a:pPr>
-            <a:r>
-              <a:rPr lang="en-US" b="0" i="0" dirty="0">
-                <a:solidFill>
-                  <a:srgbClr val="333333"/>
-                </a:solidFill>
-                <a:effectLst/>
-                <a:latin typeface="Georgia" panose="02040502050405020303" pitchFamily="18" charset="0"/>
+              <a:t>Motion coherence (the probability of any particular dot being displaced in the</a:t>
+            </a:r>
+          </a:p>
+          <a:p>
+            <a:pPr algn="l"/>
+            <a:r>
+              <a:rPr lang="en-US" sz="1800" b="0" i="0" u="none" strike="noStrike" baseline="0" dirty="0">
+                <a:latin typeface="CMR12"/>
               </a:rPr>
-              <a:t>Ratcliff Diffusion model assumes that an observer accumulates evidence for responses until a threshold level of evidence for one of the responses is reached</a:t>
+              <a:t>stimulus direction)</a:t>
             </a:r>
           </a:p>
           <a:p>
             <a:pPr algn="l"/>
             <a:r>
+              <a:rPr lang="en-US" sz="1800" b="0" i="0" u="none" strike="noStrike" baseline="0" dirty="0" err="1">
+                <a:latin typeface="CMTI12"/>
+              </a:rPr>
+              <a:t>ouse</a:t>
+            </a:r>
+            <a:r>
               <a:rPr lang="en-US" sz="1800" b="0" i="0" u="none" strike="noStrike" baseline="0" dirty="0">
-                <a:latin typeface="TimesNewRomanPS"/>
+                <a:latin typeface="CMTI12"/>
               </a:rPr>
-              <a:t>tarting</a:t>
+              <a:t> trajectory information was not predictive of post-decision</a:t>
             </a:r>
           </a:p>
           <a:p>
             <a:pPr algn="l"/>
             <a:r>
               <a:rPr lang="en-US" sz="1800" b="0" i="0" u="none" strike="noStrike" baseline="0" dirty="0">
-                <a:latin typeface="TimesNewRomanPS"/>
+                <a:latin typeface="CMTI12"/>
               </a:rPr>
-              <a:t>point </a:t>
-            </a:r>
-            <a:r>
-              <a:rPr lang="en-US" sz="1800" b="0" i="1" u="none" strike="noStrike" baseline="0" dirty="0">
-                <a:latin typeface="TimesNewRomanPS-Italic"/>
+              <a:t>certainty but was strongly related to decision accuracy.</a:t>
+            </a:r>
+          </a:p>
+          <a:p>
+            <a:pPr algn="l"/>
+            <a:r>
+              <a:rPr lang="en-US" sz="1800" b="0" i="0" u="none" strike="noStrike" baseline="0" dirty="0">
+                <a:latin typeface="CMTI12"/>
               </a:rPr>
-              <a:t>z </a:t>
-            </a:r>
-            <a:r>
-              <a:rPr lang="en-US" sz="1800" b="0" i="0" u="none" strike="noStrike" baseline="0" dirty="0">
-                <a:latin typeface="TimesNewRomanPS"/>
+              <a:t>Result of the experiment: mouse trajectories were not indicative of confidence but were related to </a:t>
+            </a:r>
+            <a:r>
+              <a:rPr lang="en-US" sz="1800" b="0" i="0" u="none" strike="noStrike" baseline="0" dirty="0" err="1">
+                <a:latin typeface="CMTI12"/>
               </a:rPr>
-              <a:t>is assumed to be equidistant from the response</a:t>
-            </a:r>
-          </a:p>
-          <a:p>
-            <a:pPr algn="l"/>
-            <a:r>
-              <a:rPr lang="en-US" sz="1800" b="0" i="0" u="none" strike="noStrike" baseline="0" dirty="0">
-                <a:latin typeface="TimesNewRomanPS"/>
-              </a:rPr>
-              <a:t>boundaries, so that </a:t>
-            </a:r>
-            <a:r>
-              <a:rPr lang="en-US" sz="1800" b="0" i="1" u="none" strike="noStrike" baseline="0" dirty="0">
-                <a:latin typeface="TimesNewRomanPS-Italic"/>
-              </a:rPr>
-              <a:t>z=a</a:t>
-            </a:r>
-            <a:r>
-              <a:rPr lang="en-US" sz="1800" b="0" i="0" u="none" strike="noStrike" baseline="0" dirty="0">
-                <a:latin typeface="TimesNewRomanPS"/>
-              </a:rPr>
-              <a:t>/2.</a:t>
-            </a:r>
-            <a:endParaRPr lang="en-US" dirty="0"/>
-          </a:p>
-          <a:p>
+              <a:t>accuarcy</a:t>
+            </a:r>
             <a:endParaRPr lang="en-US" dirty="0"/>
           </a:p>
         </p:txBody>
@@ -4030,7 +4097,7 @@
           <a:p>
             <a:fld id="{22289C57-55D7-40A4-A101-E74FAC7A092B}" type="slidenum">
               <a:rPr lang="en-US" smtClean="0"/>
-              <a:t>5</a:t>
+              <a:t>3</a:t>
             </a:fld>
             <a:endParaRPr lang="en-US" dirty="0"/>
           </a:p>
@@ -4039,7 +4106,7 @@
     </p:spTree>
     <p:extLst>
       <p:ext uri="{BB962C8B-B14F-4D97-AF65-F5344CB8AC3E}">
-        <p14:creationId xmlns:p14="http://schemas.microsoft.com/office/powerpoint/2010/main" val="3831067204"/>
+        <p14:creationId xmlns:p14="http://schemas.microsoft.com/office/powerpoint/2010/main" val="3054867290"/>
       </p:ext>
     </p:extLst>
   </p:cSld>
@@ -4094,8 +4161,26 @@
           <a:lstStyle/>
           <a:p>
             <a:r>
-              <a:rPr lang="en-US" dirty="0"/>
-              <a:t>Only 2 scored above 80% a handful above 70%</a:t>
+              <a:rPr lang="en-US" b="0" i="0" dirty="0">
+                <a:solidFill>
+                  <a:srgbClr val="333333"/>
+                </a:solidFill>
+                <a:effectLst/>
+                <a:latin typeface="Georgia" panose="02040502050405020303" pitchFamily="18" charset="0"/>
+              </a:rPr>
+              <a:t>speed–accuracy trade-off</a:t>
+            </a:r>
+          </a:p>
+          <a:p>
+            <a:r>
+              <a:rPr lang="en-US" b="0" i="0" dirty="0">
+                <a:solidFill>
+                  <a:srgbClr val="333333"/>
+                </a:solidFill>
+                <a:effectLst/>
+                <a:latin typeface="Georgia" panose="02040502050405020303" pitchFamily="18" charset="0"/>
+              </a:rPr>
+              <a:t>sequential accumulator models.</a:t>
             </a:r>
           </a:p>
           <a:p>
@@ -4117,31 +4202,70 @@
               <a:defRPr/>
             </a:pPr>
             <a:r>
-              <a:rPr lang="en-US" dirty="0"/>
-              <a:t>2 best </a:t>
-            </a:r>
-            <a:r>
-              <a:rPr lang="en-US" dirty="0" err="1"/>
-              <a:t>paritcipants</a:t>
-            </a:r>
-            <a:r>
-              <a:rPr lang="en-US" dirty="0"/>
-              <a:t> are 11 and 12</a:t>
-            </a:r>
-          </a:p>
-          <a:p>
-            <a:r>
-              <a:rPr lang="en-US" dirty="0"/>
-              <a:t>2</a:t>
-            </a:r>
-            <a:r>
-              <a:rPr lang="en-US" baseline="30000" dirty="0"/>
-              <a:t>nd</a:t>
-            </a:r>
-            <a:r>
-              <a:rPr lang="en-US" dirty="0"/>
-              <a:t> best = .875</a:t>
-            </a:r>
+              <a:rPr lang="en-US" b="0" i="0" dirty="0">
+                <a:solidFill>
+                  <a:srgbClr val="333333"/>
+                </a:solidFill>
+                <a:effectLst/>
+                <a:latin typeface="Georgia" panose="02040502050405020303" pitchFamily="18" charset="0"/>
+              </a:rPr>
+              <a:t>Ratcliff Diffusion model assumes that an observer accumulates evidence for responses until a threshold level of evidence for one of the responses is reached</a:t>
+            </a:r>
+          </a:p>
+          <a:p>
+            <a:pPr algn="l"/>
+            <a:r>
+              <a:rPr lang="en-US" sz="1800" b="0" i="0" u="none" strike="noStrike" baseline="0" dirty="0">
+                <a:latin typeface="TimesNewRomanPS"/>
+              </a:rPr>
+              <a:t>tarting</a:t>
+            </a:r>
+          </a:p>
+          <a:p>
+            <a:pPr algn="l"/>
+            <a:r>
+              <a:rPr lang="en-US" sz="1800" b="0" i="0" u="none" strike="noStrike" baseline="0" dirty="0">
+                <a:latin typeface="TimesNewRomanPS"/>
+              </a:rPr>
+              <a:t>point </a:t>
+            </a:r>
+            <a:r>
+              <a:rPr lang="en-US" sz="1800" b="0" i="1" u="none" strike="noStrike" baseline="0" dirty="0">
+                <a:latin typeface="TimesNewRomanPS-Italic"/>
+              </a:rPr>
+              <a:t>z </a:t>
+            </a:r>
+            <a:r>
+              <a:rPr lang="en-US" sz="1800" b="0" i="0" u="none" strike="noStrike" baseline="0" dirty="0">
+                <a:latin typeface="TimesNewRomanPS"/>
+              </a:rPr>
+              <a:t>is assumed to be equidistant from the response</a:t>
+            </a:r>
+          </a:p>
+          <a:p>
+            <a:pPr algn="l"/>
+            <a:r>
+              <a:rPr lang="en-US" sz="1800" b="0" i="0" u="none" strike="noStrike" baseline="0" dirty="0">
+                <a:latin typeface="TimesNewRomanPS"/>
+              </a:rPr>
+              <a:t>boundaries, so that </a:t>
+            </a:r>
+            <a:r>
+              <a:rPr lang="en-US" sz="1800" b="0" i="1" u="none" strike="noStrike" baseline="0" dirty="0">
+                <a:latin typeface="TimesNewRomanPS-Italic"/>
+              </a:rPr>
+              <a:t>z=a</a:t>
+            </a:r>
+            <a:r>
+              <a:rPr lang="en-US" sz="1800" b="0" i="0" u="none" strike="noStrike" baseline="0" dirty="0">
+                <a:latin typeface="TimesNewRomanPS"/>
+              </a:rPr>
+              <a:t>/2.</a:t>
+            </a:r>
+            <a:endParaRPr lang="en-US" dirty="0"/>
+          </a:p>
+          <a:p>
+            <a:endParaRPr lang="en-US" dirty="0"/>
           </a:p>
         </p:txBody>
       </p:sp>
@@ -4162,7 +4286,7 @@
           <a:p>
             <a:fld id="{22289C57-55D7-40A4-A101-E74FAC7A092B}" type="slidenum">
               <a:rPr lang="en-US" smtClean="0"/>
-              <a:t>7</a:t>
+              <a:t>5</a:t>
             </a:fld>
             <a:endParaRPr lang="en-US" dirty="0"/>
           </a:p>
@@ -4171,7 +4295,7 @@
     </p:spTree>
     <p:extLst>
       <p:ext uri="{BB962C8B-B14F-4D97-AF65-F5344CB8AC3E}">
-        <p14:creationId xmlns:p14="http://schemas.microsoft.com/office/powerpoint/2010/main" val="1306662678"/>
+        <p14:creationId xmlns:p14="http://schemas.microsoft.com/office/powerpoint/2010/main" val="3831067204"/>
       </p:ext>
     </p:extLst>
   </p:cSld>
@@ -4227,7 +4351,52 @@
           <a:p>
             <a:r>
               <a:rPr lang="en-US" dirty="0"/>
-              <a:t>Participant 5 responded the fastest but still scored better than average.</a:t>
+              <a:t>Only 2 scored above 80% a handful above 70%</a:t>
+            </a:r>
+          </a:p>
+          <a:p>
+            <a:pPr marL="0" marR="0" lvl="0" indent="0" algn="l" defTabSz="914400" rtl="0" eaLnBrk="1" fontAlgn="auto" latinLnBrk="0" hangingPunct="1">
+              <a:lnSpc>
+                <a:spcPct val="100000"/>
+              </a:lnSpc>
+              <a:spcBef>
+                <a:spcPts val="0"/>
+              </a:spcBef>
+              <a:spcAft>
+                <a:spcPts val="0"/>
+              </a:spcAft>
+              <a:buClrTx/>
+              <a:buSzTx/>
+              <a:buFontTx/>
+              <a:buNone/>
+              <a:tabLst/>
+              <a:defRPr/>
+            </a:pPr>
+            <a:r>
+              <a:rPr lang="en-US" dirty="0"/>
+              <a:t>2 best </a:t>
+            </a:r>
+            <a:r>
+              <a:rPr lang="en-US" dirty="0" err="1"/>
+              <a:t>paritcipants</a:t>
+            </a:r>
+            <a:r>
+              <a:rPr lang="en-US" dirty="0"/>
+              <a:t> are 11 and 12</a:t>
+            </a:r>
+          </a:p>
+          <a:p>
+            <a:r>
+              <a:rPr lang="en-US" dirty="0"/>
+              <a:t>2</a:t>
+            </a:r>
+            <a:r>
+              <a:rPr lang="en-US" baseline="30000" dirty="0"/>
+              <a:t>nd</a:t>
+            </a:r>
+            <a:r>
+              <a:rPr lang="en-US" dirty="0"/>
+              <a:t> best = .875</a:t>
             </a:r>
           </a:p>
         </p:txBody>
@@ -4249,7 +4418,7 @@
           <a:p>
             <a:fld id="{22289C57-55D7-40A4-A101-E74FAC7A092B}" type="slidenum">
               <a:rPr lang="en-US" smtClean="0"/>
-              <a:t>8</a:t>
+              <a:t>7</a:t>
             </a:fld>
             <a:endParaRPr lang="en-US" dirty="0"/>
           </a:p>
@@ -4258,7 +4427,7 @@
     </p:spTree>
     <p:extLst>
       <p:ext uri="{BB962C8B-B14F-4D97-AF65-F5344CB8AC3E}">
-        <p14:creationId xmlns:p14="http://schemas.microsoft.com/office/powerpoint/2010/main" val="424221030"/>
+        <p14:creationId xmlns:p14="http://schemas.microsoft.com/office/powerpoint/2010/main" val="1306662678"/>
       </p:ext>
     </p:extLst>
   </p:cSld>
@@ -4314,37 +4483,7 @@
           <a:p>
             <a:r>
               <a:rPr lang="en-US" dirty="0"/>
-              <a:t>3x as many easy than hard </a:t>
-            </a:r>
-            <a:r>
-              <a:rPr lang="en-US" dirty="0" err="1"/>
-              <a:t>itmes</a:t>
-            </a:r>
-            <a:r>
-              <a:rPr lang="en-US" dirty="0"/>
-              <a:t> suggest this was an easy experiment.</a:t>
-            </a:r>
-          </a:p>
-          <a:p>
-            <a:r>
-              <a:rPr lang="en-US" dirty="0" err="1"/>
-              <a:t>Kinematograms</a:t>
-            </a:r>
-            <a:r>
-              <a:rPr lang="en-US" dirty="0"/>
-              <a:t> are based on low level movement not visual acuity</a:t>
-            </a:r>
-          </a:p>
-          <a:p>
-            <a:r>
-              <a:rPr lang="en-US" dirty="0"/>
-              <a:t>Easiest item was highest coherence no training</a:t>
-            </a:r>
-          </a:p>
-          <a:p>
-            <a:r>
-              <a:rPr lang="en-US" dirty="0"/>
-              <a:t>Hardest item was lowest coherence no training</a:t>
+              <a:t>Participant 5 responded the fastest but still scored better than average.</a:t>
             </a:r>
           </a:p>
         </p:txBody>
@@ -4366,7 +4505,7 @@
           <a:p>
             <a:fld id="{22289C57-55D7-40A4-A101-E74FAC7A092B}" type="slidenum">
               <a:rPr lang="en-US" smtClean="0"/>
-              <a:t>9</a:t>
+              <a:t>8</a:t>
             </a:fld>
             <a:endParaRPr lang="en-US" dirty="0"/>
           </a:p>
@@ -4375,7 +4514,7 @@
     </p:spTree>
     <p:extLst>
       <p:ext uri="{BB962C8B-B14F-4D97-AF65-F5344CB8AC3E}">
-        <p14:creationId xmlns:p14="http://schemas.microsoft.com/office/powerpoint/2010/main" val="1472711198"/>
+        <p14:creationId xmlns:p14="http://schemas.microsoft.com/office/powerpoint/2010/main" val="424221030"/>
       </p:ext>
     </p:extLst>
   </p:cSld>
@@ -4431,7 +4570,37 @@
           <a:p>
             <a:r>
               <a:rPr lang="en-US" dirty="0"/>
-              <a:t>Goal to be at 5 mins at this mark</a:t>
+              <a:t>3x as many easy than hard </a:t>
+            </a:r>
+            <a:r>
+              <a:rPr lang="en-US" dirty="0" err="1"/>
+              <a:t>itmes</a:t>
+            </a:r>
+            <a:r>
+              <a:rPr lang="en-US" dirty="0"/>
+              <a:t> suggest this was an easy experiment.</a:t>
+            </a:r>
+          </a:p>
+          <a:p>
+            <a:r>
+              <a:rPr lang="en-US" dirty="0" err="1"/>
+              <a:t>Kinematograms</a:t>
+            </a:r>
+            <a:r>
+              <a:rPr lang="en-US" dirty="0"/>
+              <a:t> are based on low level movement not visual acuity</a:t>
+            </a:r>
+          </a:p>
+          <a:p>
+            <a:r>
+              <a:rPr lang="en-US" dirty="0"/>
+              <a:t>Easiest item was highest coherence no training</a:t>
+            </a:r>
+          </a:p>
+          <a:p>
+            <a:r>
+              <a:rPr lang="en-US" dirty="0"/>
+              <a:t>Hardest item was lowest coherence no training</a:t>
             </a:r>
           </a:p>
         </p:txBody>
@@ -4453,7 +4622,7 @@
           <a:p>
             <a:fld id="{22289C57-55D7-40A4-A101-E74FAC7A092B}" type="slidenum">
               <a:rPr lang="en-US" smtClean="0"/>
-              <a:t>10</a:t>
+              <a:t>9</a:t>
             </a:fld>
             <a:endParaRPr lang="en-US" dirty="0"/>
           </a:p>
@@ -4462,7 +4631,7 @@
     </p:spTree>
     <p:extLst>
       <p:ext uri="{BB962C8B-B14F-4D97-AF65-F5344CB8AC3E}">
-        <p14:creationId xmlns:p14="http://schemas.microsoft.com/office/powerpoint/2010/main" val="4206276693"/>
+        <p14:creationId xmlns:p14="http://schemas.microsoft.com/office/powerpoint/2010/main" val="1472711198"/>
       </p:ext>
     </p:extLst>
   </p:cSld>
@@ -4518,7 +4687,7 @@
           <a:p>
             <a:r>
               <a:rPr lang="en-US" dirty="0"/>
-              <a:t>HMS is itself an instance of Metropolis Hastings</a:t>
+              <a:t>Goal to be at 5 mins at this mark</a:t>
             </a:r>
           </a:p>
         </p:txBody>
@@ -4540,7 +4709,7 @@
           <a:p>
             <a:fld id="{22289C57-55D7-40A4-A101-E74FAC7A092B}" type="slidenum">
               <a:rPr lang="en-US" smtClean="0"/>
-              <a:t>11</a:t>
+              <a:t>10</a:t>
             </a:fld>
             <a:endParaRPr lang="en-US" dirty="0"/>
           </a:p>
@@ -4549,7 +4718,7 @@
     </p:spTree>
     <p:extLst>
       <p:ext uri="{BB962C8B-B14F-4D97-AF65-F5344CB8AC3E}">
-        <p14:creationId xmlns:p14="http://schemas.microsoft.com/office/powerpoint/2010/main" val="11979831"/>
+        <p14:creationId xmlns:p14="http://schemas.microsoft.com/office/powerpoint/2010/main" val="4206276693"/>
       </p:ext>
     </p:extLst>
   </p:cSld>
@@ -4603,87 +4772,10 @@
           <a:bodyPr/>
           <a:lstStyle/>
           <a:p>
-            <a:pPr algn="l"/>
-            <a:endParaRPr lang="en-US" sz="1800" b="0" i="0" u="none" strike="noStrike" baseline="0" dirty="0">
-              <a:solidFill>
-                <a:srgbClr val="000000"/>
-              </a:solidFill>
-              <a:latin typeface="Calibri" panose="020F0502020204030204" pitchFamily="34" charset="0"/>
-            </a:endParaRPr>
-          </a:p>
-          <a:p>
-            <a:r>
-              <a:rPr lang="en-US" sz="1800" b="0" i="0" u="none" strike="noStrike" baseline="0" dirty="0">
-                <a:solidFill>
-                  <a:srgbClr val="000000"/>
-                </a:solidFill>
-                <a:latin typeface="Calibri" panose="020F0502020204030204" pitchFamily="34" charset="0"/>
-              </a:rPr>
-              <a:t>Discuss range of values supported by your model</a:t>
-            </a:r>
-          </a:p>
-          <a:p>
-            <a:r>
-              <a:rPr lang="en-US" sz="1800" b="0" i="0" u="none" strike="noStrike" baseline="0" dirty="0">
-                <a:solidFill>
-                  <a:srgbClr val="000000"/>
-                </a:solidFill>
-                <a:latin typeface="Arial" panose="020B0604020202020204" pitchFamily="34" charset="0"/>
-              </a:rPr>
-              <a:t>•</a:t>
-            </a:r>
-            <a:r>
-              <a:rPr lang="en-US" sz="1800" b="0" i="0" u="none" strike="noStrike" baseline="0" dirty="0">
-                <a:solidFill>
-                  <a:srgbClr val="000000"/>
-                </a:solidFill>
-                <a:latin typeface="Calibri" panose="020F0502020204030204" pitchFamily="34" charset="0"/>
-              </a:rPr>
-              <a:t>Discuss whether your priors are weak, strong or un-informative</a:t>
-            </a:r>
-          </a:p>
-          <a:p>
-            <a:r>
-              <a:rPr lang="en-US" sz="1800" b="0" i="0" u="none" strike="noStrike" baseline="0" dirty="0">
-                <a:solidFill>
-                  <a:srgbClr val="000000"/>
-                </a:solidFill>
-                <a:latin typeface="Arial" panose="020B0604020202020204" pitchFamily="34" charset="0"/>
-              </a:rPr>
-              <a:t>•</a:t>
-            </a:r>
-            <a:r>
-              <a:rPr lang="en-US" sz="1800" b="0" i="0" u="none" strike="noStrike" baseline="0" dirty="0">
-                <a:solidFill>
-                  <a:srgbClr val="000000"/>
-                </a:solidFill>
-                <a:latin typeface="Calibri" panose="020F0502020204030204" pitchFamily="34" charset="0"/>
-              </a:rPr>
-              <a:t>Discuss an implication of prior choice.</a:t>
-            </a:r>
-          </a:p>
-          <a:p>
-            <a:r>
-              <a:rPr lang="en-US" sz="1800" b="0" i="0" u="none" strike="noStrike" baseline="0" dirty="0">
-                <a:solidFill>
-                  <a:srgbClr val="000000"/>
-                </a:solidFill>
-                <a:latin typeface="Arial" panose="020B0604020202020204" pitchFamily="34" charset="0"/>
-              </a:rPr>
-              <a:t>•</a:t>
-            </a:r>
-            <a:r>
-              <a:rPr lang="en-US" sz="1800" b="0" i="0" u="none" strike="noStrike" baseline="0" dirty="0">
-                <a:solidFill>
-                  <a:srgbClr val="000000"/>
-                </a:solidFill>
-                <a:latin typeface="Calibri" panose="020F0502020204030204" pitchFamily="34" charset="0"/>
-              </a:rPr>
-              <a:t>Discuss why the pattern flipped in case of response accuracy.</a:t>
-            </a:r>
-          </a:p>
-          <a:p>
-            <a:endParaRPr lang="en-US" dirty="0"/>
+            <a:r>
+              <a:rPr lang="en-US" dirty="0"/>
+              <a:t>HMS is itself an instance of Metropolis Hastings</a:t>
+            </a:r>
           </a:p>
         </p:txBody>
       </p:sp>
@@ -4704,7 +4796,7 @@
           <a:p>
             <a:fld id="{22289C57-55D7-40A4-A101-E74FAC7A092B}" type="slidenum">
               <a:rPr lang="en-US" smtClean="0"/>
-              <a:t>14</a:t>
+              <a:t>11</a:t>
             </a:fld>
             <a:endParaRPr lang="en-US" dirty="0"/>
           </a:p>
@@ -4713,7 +4805,7 @@
     </p:spTree>
     <p:extLst>
       <p:ext uri="{BB962C8B-B14F-4D97-AF65-F5344CB8AC3E}">
-        <p14:creationId xmlns:p14="http://schemas.microsoft.com/office/powerpoint/2010/main" val="1233011643"/>
+        <p14:creationId xmlns:p14="http://schemas.microsoft.com/office/powerpoint/2010/main" val="11979831"/>
       </p:ext>
     </p:extLst>
   </p:cSld>
@@ -14345,39 +14437,6 @@
       </p:sp>
       <p:sp>
         <p:nvSpPr>
-          <p:cNvPr id="6" name="Text Placeholder 5">
-            <a:extLst>
-              <a:ext uri="{FF2B5EF4-FFF2-40B4-BE49-F238E27FC236}">
-                <a16:creationId xmlns:a16="http://schemas.microsoft.com/office/drawing/2014/main" id="{F30780D1-5C1B-411C-81ED-7B9970FCBF8A}"/>
-              </a:ext>
-            </a:extLst>
-          </p:cNvPr>
-          <p:cNvSpPr>
-            <a:spLocks noGrp="1"/>
-          </p:cNvSpPr>
-          <p:nvPr>
-            <p:ph type="body" sz="quarter" idx="16"/>
-          </p:nvPr>
-        </p:nvSpPr>
-        <p:spPr>
-          <a:xfrm>
-            <a:off x="1922756" y="4736748"/>
-            <a:ext cx="2141764" cy="514350"/>
-          </a:xfrm>
-        </p:spPr>
-        <p:txBody>
-          <a:bodyPr/>
-          <a:lstStyle/>
-          <a:p>
-            <a:r>
-              <a:rPr lang="en-US" dirty="0"/>
-              <a:t>4</a:t>
-            </a:r>
-          </a:p>
-        </p:txBody>
-      </p:sp>
-      <p:sp>
-        <p:nvSpPr>
           <p:cNvPr id="12" name="Text Placeholder 11">
             <a:extLst>
               <a:ext uri="{FF2B5EF4-FFF2-40B4-BE49-F238E27FC236}">
@@ -14441,7 +14500,7 @@
           <a:p>
             <a:r>
               <a:rPr lang="en-US" sz="1800" dirty="0"/>
-              <a:t>Unlike HMC, NUTS doesn’t require user to set a number of steps</a:t>
+              <a:t>Unlike HMC, NUTS doesn’t require user to set a specific number of steps</a:t>
             </a:r>
           </a:p>
         </p:txBody>
@@ -14475,41 +14534,9 @@
           <a:lstStyle/>
           <a:p>
             <a:r>
-              <a:rPr lang="en-US" dirty="0"/>
+              <a:rPr lang="en-US" sz="1800" dirty="0"/>
               <a:t>NUTS performs as efficiently as standard HMC method</a:t>
             </a:r>
-          </a:p>
-        </p:txBody>
-      </p:sp>
-      <p:sp>
-        <p:nvSpPr>
-          <p:cNvPr id="15" name="Text Placeholder 14">
-            <a:extLst>
-              <a:ext uri="{FF2B5EF4-FFF2-40B4-BE49-F238E27FC236}">
-                <a16:creationId xmlns:a16="http://schemas.microsoft.com/office/drawing/2014/main" id="{9405A1F0-98C1-4B11-8D9A-3C009ADC44D0}"/>
-              </a:ext>
-            </a:extLst>
-          </p:cNvPr>
-          <p:cNvSpPr>
-            <a:spLocks noGrp="1"/>
-          </p:cNvSpPr>
-          <p:nvPr>
-            <p:ph type="body" sz="quarter" idx="20"/>
-          </p:nvPr>
-        </p:nvSpPr>
-        <p:spPr>
-          <a:xfrm>
-            <a:off x="6175280" y="4824430"/>
-            <a:ext cx="5102680" cy="1010842"/>
-          </a:xfrm>
-        </p:spPr>
-        <p:txBody>
-          <a:bodyPr>
-            <a:normAutofit/>
-          </a:bodyPr>
-          <a:lstStyle/>
-          <a:p>
-            <a:endParaRPr lang="en-US" dirty="0"/>
           </a:p>
         </p:txBody>
       </p:sp>

</xml_diff>

<commit_message>
Upload images to README
</commit_message>
<xml_diff>
--- a/ezDiffusion.pptx
+++ b/ezDiffusion.pptx
@@ -2857,7 +2857,7 @@
           <a:p>
             <a:fld id="{B56F32FC-4BD9-442A-A8C6-51598C909FE3}" type="datetimeFigureOut">
               <a:rPr lang="en-US" smtClean="0"/>
-              <a:t>3/20/2024</a:t>
+              <a:t>4/11/2024</a:t>
             </a:fld>
             <a:endParaRPr lang="en-US" dirty="0"/>
           </a:p>
@@ -3034,7 +3034,7 @@
           <a:p>
             <a:fld id="{056371FA-A98D-41E8-93F4-09945841298A}" type="datetimeFigureOut">
               <a:rPr lang="en-US" smtClean="0"/>
-              <a:t>3/20/2024</a:t>
+              <a:t>4/11/2024</a:t>
             </a:fld>
             <a:endParaRPr lang="en-US" dirty="0"/>
           </a:p>
@@ -3345,7 +3345,10 @@
           <a:bodyPr/>
           <a:lstStyle/>
           <a:p>
-            <a:endParaRPr lang="en-US" dirty="0"/>
+            <a:r>
+              <a:rPr lang="en-US" dirty="0"/>
+              <a:t>In this presentation I will be examining EZ diffusion parameters for Response accuracy and Response time</a:t>
+            </a:r>
           </a:p>
         </p:txBody>
       </p:sp>
@@ -3429,87 +3432,10 @@
           <a:bodyPr/>
           <a:lstStyle/>
           <a:p>
-            <a:pPr algn="l"/>
-            <a:endParaRPr lang="en-US" sz="1800" b="0" i="0" u="none" strike="noStrike" baseline="0" dirty="0">
-              <a:solidFill>
-                <a:srgbClr val="000000"/>
-              </a:solidFill>
-              <a:latin typeface="Calibri" panose="020F0502020204030204" pitchFamily="34" charset="0"/>
-            </a:endParaRPr>
-          </a:p>
-          <a:p>
-            <a:r>
-              <a:rPr lang="en-US" sz="1800" b="0" i="0" u="none" strike="noStrike" baseline="0" dirty="0">
-                <a:solidFill>
-                  <a:srgbClr val="000000"/>
-                </a:solidFill>
-                <a:latin typeface="Calibri" panose="020F0502020204030204" pitchFamily="34" charset="0"/>
-              </a:rPr>
-              <a:t>Discuss range of values supported by your model</a:t>
-            </a:r>
-          </a:p>
-          <a:p>
-            <a:r>
-              <a:rPr lang="en-US" sz="1800" b="0" i="0" u="none" strike="noStrike" baseline="0" dirty="0">
-                <a:solidFill>
-                  <a:srgbClr val="000000"/>
-                </a:solidFill>
-                <a:latin typeface="Arial" panose="020B0604020202020204" pitchFamily="34" charset="0"/>
-              </a:rPr>
-              <a:t>•</a:t>
-            </a:r>
-            <a:r>
-              <a:rPr lang="en-US" sz="1800" b="0" i="0" u="none" strike="noStrike" baseline="0" dirty="0">
-                <a:solidFill>
-                  <a:srgbClr val="000000"/>
-                </a:solidFill>
-                <a:latin typeface="Calibri" panose="020F0502020204030204" pitchFamily="34" charset="0"/>
-              </a:rPr>
-              <a:t>Discuss whether your priors are weak, strong or un-informative</a:t>
-            </a:r>
-          </a:p>
-          <a:p>
-            <a:r>
-              <a:rPr lang="en-US" sz="1800" b="0" i="0" u="none" strike="noStrike" baseline="0" dirty="0">
-                <a:solidFill>
-                  <a:srgbClr val="000000"/>
-                </a:solidFill>
-                <a:latin typeface="Arial" panose="020B0604020202020204" pitchFamily="34" charset="0"/>
-              </a:rPr>
-              <a:t>•</a:t>
-            </a:r>
-            <a:r>
-              <a:rPr lang="en-US" sz="1800" b="0" i="0" u="none" strike="noStrike" baseline="0" dirty="0">
-                <a:solidFill>
-                  <a:srgbClr val="000000"/>
-                </a:solidFill>
-                <a:latin typeface="Calibri" panose="020F0502020204030204" pitchFamily="34" charset="0"/>
-              </a:rPr>
-              <a:t>Discuss an implication of prior choice.</a:t>
-            </a:r>
-          </a:p>
-          <a:p>
-            <a:r>
-              <a:rPr lang="en-US" sz="1800" b="0" i="0" u="none" strike="noStrike" baseline="0" dirty="0">
-                <a:solidFill>
-                  <a:srgbClr val="000000"/>
-                </a:solidFill>
-                <a:latin typeface="Arial" panose="020B0604020202020204" pitchFamily="34" charset="0"/>
-              </a:rPr>
-              <a:t>•</a:t>
-            </a:r>
-            <a:r>
-              <a:rPr lang="en-US" sz="1800" b="0" i="0" u="none" strike="noStrike" baseline="0" dirty="0">
-                <a:solidFill>
-                  <a:srgbClr val="000000"/>
-                </a:solidFill>
-                <a:latin typeface="Calibri" panose="020F0502020204030204" pitchFamily="34" charset="0"/>
-              </a:rPr>
-              <a:t>Discuss why the pattern flipped in case of response accuracy.</a:t>
-            </a:r>
-          </a:p>
-          <a:p>
-            <a:endParaRPr lang="en-US" dirty="0"/>
+            <a:r>
+              <a:rPr lang="en-US" dirty="0"/>
+              <a:t>HMS is itself an instance of Metropolis Hastings</a:t>
+            </a:r>
           </a:p>
         </p:txBody>
       </p:sp>
@@ -3530,7 +3456,7 @@
           <a:p>
             <a:fld id="{22289C57-55D7-40A4-A101-E74FAC7A092B}" type="slidenum">
               <a:rPr lang="en-US" smtClean="0"/>
-              <a:t>14</a:t>
+              <a:t>11</a:t>
             </a:fld>
             <a:endParaRPr lang="en-US" dirty="0"/>
           </a:p>
@@ -3539,7 +3465,7 @@
     </p:spTree>
     <p:extLst>
       <p:ext uri="{BB962C8B-B14F-4D97-AF65-F5344CB8AC3E}">
-        <p14:creationId xmlns:p14="http://schemas.microsoft.com/office/powerpoint/2010/main" val="1233011643"/>
+        <p14:creationId xmlns:p14="http://schemas.microsoft.com/office/powerpoint/2010/main" val="11979831"/>
       </p:ext>
     </p:extLst>
   </p:cSld>
@@ -3593,10 +3519,87 @@
           <a:bodyPr/>
           <a:lstStyle/>
           <a:p>
-            <a:r>
-              <a:rPr lang="en-US" dirty="0"/>
-              <a:t>Goal to be at 10 min mark by this slide</a:t>
-            </a:r>
+            <a:pPr algn="l"/>
+            <a:endParaRPr lang="en-US" sz="1800" b="0" i="0" u="none" strike="noStrike" baseline="0" dirty="0">
+              <a:solidFill>
+                <a:srgbClr val="000000"/>
+              </a:solidFill>
+              <a:latin typeface="Calibri" panose="020F0502020204030204" pitchFamily="34" charset="0"/>
+            </a:endParaRPr>
+          </a:p>
+          <a:p>
+            <a:r>
+              <a:rPr lang="en-US" sz="1800" b="0" i="0" u="none" strike="noStrike" baseline="0" dirty="0">
+                <a:solidFill>
+                  <a:srgbClr val="000000"/>
+                </a:solidFill>
+                <a:latin typeface="Calibri" panose="020F0502020204030204" pitchFamily="34" charset="0"/>
+              </a:rPr>
+              <a:t>Discuss range of values supported by your model</a:t>
+            </a:r>
+          </a:p>
+          <a:p>
+            <a:r>
+              <a:rPr lang="en-US" sz="1800" b="0" i="0" u="none" strike="noStrike" baseline="0" dirty="0">
+                <a:solidFill>
+                  <a:srgbClr val="000000"/>
+                </a:solidFill>
+                <a:latin typeface="Arial" panose="020B0604020202020204" pitchFamily="34" charset="0"/>
+              </a:rPr>
+              <a:t>•</a:t>
+            </a:r>
+            <a:r>
+              <a:rPr lang="en-US" sz="1800" b="0" i="0" u="none" strike="noStrike" baseline="0" dirty="0">
+                <a:solidFill>
+                  <a:srgbClr val="000000"/>
+                </a:solidFill>
+                <a:latin typeface="Calibri" panose="020F0502020204030204" pitchFamily="34" charset="0"/>
+              </a:rPr>
+              <a:t>Discuss whether your priors are weak, strong or un-informative</a:t>
+            </a:r>
+          </a:p>
+          <a:p>
+            <a:r>
+              <a:rPr lang="en-US" sz="1800" b="0" i="0" u="none" strike="noStrike" baseline="0" dirty="0">
+                <a:solidFill>
+                  <a:srgbClr val="000000"/>
+                </a:solidFill>
+                <a:latin typeface="Arial" panose="020B0604020202020204" pitchFamily="34" charset="0"/>
+              </a:rPr>
+              <a:t>•</a:t>
+            </a:r>
+            <a:r>
+              <a:rPr lang="en-US" sz="1800" b="0" i="0" u="none" strike="noStrike" baseline="0" dirty="0">
+                <a:solidFill>
+                  <a:srgbClr val="000000"/>
+                </a:solidFill>
+                <a:latin typeface="Calibri" panose="020F0502020204030204" pitchFamily="34" charset="0"/>
+              </a:rPr>
+              <a:t>Discuss an implication of prior choice.</a:t>
+            </a:r>
+          </a:p>
+          <a:p>
+            <a:r>
+              <a:rPr lang="en-US" sz="1800" b="0" i="0" u="none" strike="noStrike" baseline="0" dirty="0">
+                <a:solidFill>
+                  <a:srgbClr val="000000"/>
+                </a:solidFill>
+                <a:latin typeface="Arial" panose="020B0604020202020204" pitchFamily="34" charset="0"/>
+              </a:rPr>
+              <a:t>•</a:t>
+            </a:r>
+            <a:r>
+              <a:rPr lang="en-US" sz="1800" b="0" i="0" u="none" strike="noStrike" baseline="0" dirty="0">
+                <a:solidFill>
+                  <a:srgbClr val="000000"/>
+                </a:solidFill>
+                <a:latin typeface="Calibri" panose="020F0502020204030204" pitchFamily="34" charset="0"/>
+              </a:rPr>
+              <a:t>Discuss why the pattern flipped in case of response accuracy.</a:t>
+            </a:r>
+          </a:p>
+          <a:p>
+            <a:endParaRPr lang="en-US" dirty="0"/>
           </a:p>
         </p:txBody>
       </p:sp>
@@ -3617,7 +3620,7 @@
           <a:p>
             <a:fld id="{22289C57-55D7-40A4-A101-E74FAC7A092B}" type="slidenum">
               <a:rPr lang="en-US" smtClean="0"/>
-              <a:t>17</a:t>
+              <a:t>14</a:t>
             </a:fld>
             <a:endParaRPr lang="en-US" dirty="0"/>
           </a:p>
@@ -3626,7 +3629,7 @@
     </p:spTree>
     <p:extLst>
       <p:ext uri="{BB962C8B-B14F-4D97-AF65-F5344CB8AC3E}">
-        <p14:creationId xmlns:p14="http://schemas.microsoft.com/office/powerpoint/2010/main" val="4168332215"/>
+        <p14:creationId xmlns:p14="http://schemas.microsoft.com/office/powerpoint/2010/main" val="1233011643"/>
       </p:ext>
     </p:extLst>
   </p:cSld>
@@ -3681,6 +3684,93 @@
           <a:lstStyle/>
           <a:p>
             <a:r>
+              <a:rPr lang="en-US" dirty="0"/>
+              <a:t>Goal to be at 10 min mark by this slide</a:t>
+            </a:r>
+          </a:p>
+        </p:txBody>
+      </p:sp>
+      <p:sp>
+        <p:nvSpPr>
+          <p:cNvPr id="4" name="Slide Number Placeholder 3"/>
+          <p:cNvSpPr>
+            <a:spLocks noGrp="1"/>
+          </p:cNvSpPr>
+          <p:nvPr>
+            <p:ph type="sldNum" sz="quarter" idx="5"/>
+          </p:nvPr>
+        </p:nvSpPr>
+        <p:spPr/>
+        <p:txBody>
+          <a:bodyPr/>
+          <a:lstStyle/>
+          <a:p>
+            <a:fld id="{22289C57-55D7-40A4-A101-E74FAC7A092B}" type="slidenum">
+              <a:rPr lang="en-US" smtClean="0"/>
+              <a:t>17</a:t>
+            </a:fld>
+            <a:endParaRPr lang="en-US" dirty="0"/>
+          </a:p>
+        </p:txBody>
+      </p:sp>
+    </p:spTree>
+    <p:extLst>
+      <p:ext uri="{BB962C8B-B14F-4D97-AF65-F5344CB8AC3E}">
+        <p14:creationId xmlns:p14="http://schemas.microsoft.com/office/powerpoint/2010/main" val="4168332215"/>
+      </p:ext>
+    </p:extLst>
+  </p:cSld>
+  <p:clrMapOvr>
+    <a:masterClrMapping/>
+  </p:clrMapOvr>
+</p:notes>
+</file>
+
+<file path=ppt/notesSlides/notesSlide13.xml><?xml version="1.0" encoding="utf-8"?>
+<p:notes xmlns:a="http://schemas.openxmlformats.org/drawingml/2006/main" xmlns:r="http://schemas.openxmlformats.org/officeDocument/2006/relationships" xmlns:p="http://schemas.openxmlformats.org/presentationml/2006/main">
+  <p:cSld>
+    <p:spTree>
+      <p:nvGrpSpPr>
+        <p:cNvPr id="1" name=""/>
+        <p:cNvGrpSpPr/>
+        <p:nvPr/>
+      </p:nvGrpSpPr>
+      <p:grpSpPr>
+        <a:xfrm>
+          <a:off x="0" y="0"/>
+          <a:ext cx="0" cy="0"/>
+          <a:chOff x="0" y="0"/>
+          <a:chExt cx="0" cy="0"/>
+        </a:xfrm>
+      </p:grpSpPr>
+      <p:sp>
+        <p:nvSpPr>
+          <p:cNvPr id="2" name="Slide Image Placeholder 1"/>
+          <p:cNvSpPr>
+            <a:spLocks noGrp="1" noRot="1" noChangeAspect="1"/>
+          </p:cNvSpPr>
+          <p:nvPr>
+            <p:ph type="sldImg"/>
+          </p:nvPr>
+        </p:nvSpPr>
+        <p:spPr/>
+      </p:sp>
+      <p:sp>
+        <p:nvSpPr>
+          <p:cNvPr id="3" name="Notes Placeholder 2"/>
+          <p:cNvSpPr>
+            <a:spLocks noGrp="1"/>
+          </p:cNvSpPr>
+          <p:nvPr>
+            <p:ph type="body" idx="1"/>
+          </p:nvPr>
+        </p:nvSpPr>
+        <p:spPr/>
+        <p:txBody>
+          <a:bodyPr/>
+          <a:lstStyle/>
+          <a:p>
+            <a:r>
               <a:rPr lang="en-US" sz="1200" b="0" i="0" u="none" strike="noStrike" baseline="0" dirty="0">
                 <a:solidFill>
                   <a:srgbClr val="000000"/>
@@ -3771,7 +3861,7 @@
 </p:notes>
 </file>
 
-<file path=ppt/notesSlides/notesSlide13.xml><?xml version="1.0" encoding="utf-8"?>
+<file path=ppt/notesSlides/notesSlide14.xml><?xml version="1.0" encoding="utf-8"?>
 <p:notes xmlns:a="http://schemas.openxmlformats.org/drawingml/2006/main" xmlns:r="http://schemas.openxmlformats.org/officeDocument/2006/relationships" xmlns:p="http://schemas.openxmlformats.org/presentationml/2006/main">
   <p:cSld>
     <p:spTree>
@@ -3901,13 +3991,8 @@
           <a:p>
             <a:r>
               <a:rPr lang="en-US" dirty="0"/>
-              <a:t>The article from which the data used in this </a:t>
-            </a:r>
-            <a:r>
-              <a:rPr lang="en-US"/>
-              <a:t>project originates.</a:t>
-            </a:r>
-            <a:endParaRPr lang="en-US" dirty="0"/>
+              <a:t>The paper from which the dataset in this project originates.</a:t>
+            </a:r>
           </a:p>
         </p:txBody>
       </p:sp>
@@ -3993,6 +4078,12 @@
           <a:p>
             <a:r>
               <a:rPr lang="en-US" dirty="0"/>
+              <a:t>Participants report direction of this movement according to coherence level</a:t>
+            </a:r>
+          </a:p>
+          <a:p>
+            <a:r>
+              <a:rPr lang="en-US" dirty="0"/>
               <a:t>Participants required to view RDK and report dominant direction via mouse movements</a:t>
             </a:r>
           </a:p>
@@ -4351,52 +4442,7 @@
           <a:p>
             <a:r>
               <a:rPr lang="en-US" dirty="0"/>
-              <a:t>Only 2 scored above 80% a handful above 70%</a:t>
-            </a:r>
-          </a:p>
-          <a:p>
-            <a:pPr marL="0" marR="0" lvl="0" indent="0" algn="l" defTabSz="914400" rtl="0" eaLnBrk="1" fontAlgn="auto" latinLnBrk="0" hangingPunct="1">
-              <a:lnSpc>
-                <a:spcPct val="100000"/>
-              </a:lnSpc>
-              <a:spcBef>
-                <a:spcPts val="0"/>
-              </a:spcBef>
-              <a:spcAft>
-                <a:spcPts val="0"/>
-              </a:spcAft>
-              <a:buClrTx/>
-              <a:buSzTx/>
-              <a:buFontTx/>
-              <a:buNone/>
-              <a:tabLst/>
-              <a:defRPr/>
-            </a:pPr>
-            <a:r>
-              <a:rPr lang="en-US" dirty="0"/>
-              <a:t>2 best </a:t>
-            </a:r>
-            <a:r>
-              <a:rPr lang="en-US" dirty="0" err="1"/>
-              <a:t>paritcipants</a:t>
-            </a:r>
-            <a:r>
-              <a:rPr lang="en-US" dirty="0"/>
-              <a:t> are 11 and 12</a:t>
-            </a:r>
-          </a:p>
-          <a:p>
-            <a:r>
-              <a:rPr lang="en-US" dirty="0"/>
-              <a:t>2</a:t>
-            </a:r>
-            <a:r>
-              <a:rPr lang="en-US" baseline="30000" dirty="0"/>
-              <a:t>nd</a:t>
-            </a:r>
-            <a:r>
-              <a:rPr lang="en-US" dirty="0"/>
-              <a:t> best = .875</a:t>
+              <a:t>Let's look at the dataset more closely.</a:t>
             </a:r>
           </a:p>
         </p:txBody>
@@ -4418,7 +4464,7 @@
           <a:p>
             <a:fld id="{22289C57-55D7-40A4-A101-E74FAC7A092B}" type="slidenum">
               <a:rPr lang="en-US" smtClean="0"/>
-              <a:t>7</a:t>
+              <a:t>6</a:t>
             </a:fld>
             <a:endParaRPr lang="en-US" dirty="0"/>
           </a:p>
@@ -4427,7 +4473,7 @@
     </p:spTree>
     <p:extLst>
       <p:ext uri="{BB962C8B-B14F-4D97-AF65-F5344CB8AC3E}">
-        <p14:creationId xmlns:p14="http://schemas.microsoft.com/office/powerpoint/2010/main" val="1306662678"/>
+        <p14:creationId xmlns:p14="http://schemas.microsoft.com/office/powerpoint/2010/main" val="3686524638"/>
       </p:ext>
     </p:extLst>
   </p:cSld>
@@ -4483,7 +4529,7 @@
           <a:p>
             <a:r>
               <a:rPr lang="en-US" dirty="0"/>
-              <a:t>Participant 5 responded the fastest but still scored better than average.</a:t>
+              <a:t>This figure shows the overall score of each individual based on the number items they answered correctly. Participants demonstrated a mean accuracy score of 64.5%. The highest scoring individual, circled in green, scored a 93.7% followed by the second highest score of 87.5%. Finally, six participants tied for lowest rate of accuracy, each receiving a score of 50%. Taken together, these statistics may suggest that the tasks presented in this experiment required a moderate to high level of effort.</a:t>
             </a:r>
           </a:p>
         </p:txBody>
@@ -4505,7 +4551,7 @@
           <a:p>
             <a:fld id="{22289C57-55D7-40A4-A101-E74FAC7A092B}" type="slidenum">
               <a:rPr lang="en-US" smtClean="0"/>
-              <a:t>8</a:t>
+              <a:t>7</a:t>
             </a:fld>
             <a:endParaRPr lang="en-US" dirty="0"/>
           </a:p>
@@ -4514,7 +4560,7 @@
     </p:spTree>
     <p:extLst>
       <p:ext uri="{BB962C8B-B14F-4D97-AF65-F5344CB8AC3E}">
-        <p14:creationId xmlns:p14="http://schemas.microsoft.com/office/powerpoint/2010/main" val="424221030"/>
+        <p14:creationId xmlns:p14="http://schemas.microsoft.com/office/powerpoint/2010/main" val="1306662678"/>
       </p:ext>
     </p:extLst>
   </p:cSld>
@@ -4570,37 +4616,15 @@
           <a:p>
             <a:r>
               <a:rPr lang="en-US" dirty="0"/>
-              <a:t>3x as many easy than hard </a:t>
+              <a:t>This figure shows the total amount of time (seconds) that each participant took to complete all tasks. Participants demonstrated a mean response time of 48.25 seconds. The red circle indicates the participant with the largest amount of time taken with 91.7 seconds. On the other hand, the fastest participant, circled in green, only took 13.86 seconds. Notably, the participant who completed </a:t>
             </a:r>
             <a:r>
               <a:rPr lang="en-US" dirty="0" err="1"/>
-              <a:t>itmes</a:t>
+              <a:t>teh</a:t>
             </a:r>
             <a:r>
               <a:rPr lang="en-US" dirty="0"/>
-              <a:t> suggest this was an easy experiment.</a:t>
-            </a:r>
-          </a:p>
-          <a:p>
-            <a:r>
-              <a:rPr lang="en-US" dirty="0" err="1"/>
-              <a:t>Kinematograms</a:t>
-            </a:r>
-            <a:r>
-              <a:rPr lang="en-US" dirty="0"/>
-              <a:t> are based on low level movement not visual acuity</a:t>
-            </a:r>
-          </a:p>
-          <a:p>
-            <a:r>
-              <a:rPr lang="en-US" dirty="0"/>
-              <a:t>Easiest item was highest coherence no training</a:t>
-            </a:r>
-          </a:p>
-          <a:p>
-            <a:r>
-              <a:rPr lang="en-US" dirty="0"/>
-              <a:t>Hardest item was lowest coherence no training</a:t>
+              <a:t> still scored above average rate of response accuracy.</a:t>
             </a:r>
           </a:p>
         </p:txBody>
@@ -4622,7 +4646,7 @@
           <a:p>
             <a:fld id="{22289C57-55D7-40A4-A101-E74FAC7A092B}" type="slidenum">
               <a:rPr lang="en-US" smtClean="0"/>
-              <a:t>9</a:t>
+              <a:t>8</a:t>
             </a:fld>
             <a:endParaRPr lang="en-US" dirty="0"/>
           </a:p>
@@ -4631,7 +4655,7 @@
     </p:spTree>
     <p:extLst>
       <p:ext uri="{BB962C8B-B14F-4D97-AF65-F5344CB8AC3E}">
-        <p14:creationId xmlns:p14="http://schemas.microsoft.com/office/powerpoint/2010/main" val="1472711198"/>
+        <p14:creationId xmlns:p14="http://schemas.microsoft.com/office/powerpoint/2010/main" val="424221030"/>
       </p:ext>
     </p:extLst>
   </p:cSld>
@@ -4687,7 +4711,37 @@
           <a:p>
             <a:r>
               <a:rPr lang="en-US" dirty="0"/>
-              <a:t>Goal to be at 5 mins at this mark</a:t>
+              <a:t>3x as many easy than hard </a:t>
+            </a:r>
+            <a:r>
+              <a:rPr lang="en-US" dirty="0" err="1"/>
+              <a:t>itmes</a:t>
+            </a:r>
+            <a:r>
+              <a:rPr lang="en-US" dirty="0"/>
+              <a:t> suggest this was an easy experiment.</a:t>
+            </a:r>
+          </a:p>
+          <a:p>
+            <a:r>
+              <a:rPr lang="en-US" dirty="0" err="1"/>
+              <a:t>Kinematograms</a:t>
+            </a:r>
+            <a:r>
+              <a:rPr lang="en-US" dirty="0"/>
+              <a:t> are based on low level movement not visual acuity</a:t>
+            </a:r>
+          </a:p>
+          <a:p>
+            <a:r>
+              <a:rPr lang="en-US" dirty="0"/>
+              <a:t>Easiest item was highest coherence no training</a:t>
+            </a:r>
+          </a:p>
+          <a:p>
+            <a:r>
+              <a:rPr lang="en-US" dirty="0"/>
+              <a:t>Hardest item was lowest coherence no training</a:t>
             </a:r>
           </a:p>
         </p:txBody>
@@ -4709,7 +4763,7 @@
           <a:p>
             <a:fld id="{22289C57-55D7-40A4-A101-E74FAC7A092B}" type="slidenum">
               <a:rPr lang="en-US" smtClean="0"/>
-              <a:t>10</a:t>
+              <a:t>9</a:t>
             </a:fld>
             <a:endParaRPr lang="en-US" dirty="0"/>
           </a:p>
@@ -4718,7 +4772,7 @@
     </p:spTree>
     <p:extLst>
       <p:ext uri="{BB962C8B-B14F-4D97-AF65-F5344CB8AC3E}">
-        <p14:creationId xmlns:p14="http://schemas.microsoft.com/office/powerpoint/2010/main" val="4206276693"/>
+        <p14:creationId xmlns:p14="http://schemas.microsoft.com/office/powerpoint/2010/main" val="1472711198"/>
       </p:ext>
     </p:extLst>
   </p:cSld>
@@ -4774,7 +4828,7 @@
           <a:p>
             <a:r>
               <a:rPr lang="en-US" dirty="0"/>
-              <a:t>HMS is itself an instance of Metropolis Hastings</a:t>
+              <a:t>Goal to be at 5 mins at this mark</a:t>
             </a:r>
           </a:p>
         </p:txBody>
@@ -4796,7 +4850,7 @@
           <a:p>
             <a:fld id="{22289C57-55D7-40A4-A101-E74FAC7A092B}" type="slidenum">
               <a:rPr lang="en-US" smtClean="0"/>
-              <a:t>11</a:t>
+              <a:t>10</a:t>
             </a:fld>
             <a:endParaRPr lang="en-US" dirty="0"/>
           </a:p>
@@ -4805,7 +4859,7 @@
     </p:spTree>
     <p:extLst>
       <p:ext uri="{BB962C8B-B14F-4D97-AF65-F5344CB8AC3E}">
-        <p14:creationId xmlns:p14="http://schemas.microsoft.com/office/powerpoint/2010/main" val="11979831"/>
+        <p14:creationId xmlns:p14="http://schemas.microsoft.com/office/powerpoint/2010/main" val="4206276693"/>
       </p:ext>
     </p:extLst>
   </p:cSld>
@@ -13685,7 +13739,7 @@
           <a:p>
             <a:r>
               <a:rPr lang="en-US" dirty="0"/>
-              <a:t>Examine </a:t>
+              <a:t>Examining </a:t>
             </a:r>
             <a:r>
               <a:rPr lang="en-US" dirty="0" err="1"/>
@@ -13735,44 +13789,6 @@
               <a:t>Saucedo</a:t>
             </a:r>
             <a:endParaRPr lang="en-US" dirty="0"/>
-          </a:p>
-        </p:txBody>
-      </p:sp>
-      <p:sp>
-        <p:nvSpPr>
-          <p:cNvPr id="8" name="Date Placeholder 3">
-            <a:extLst>
-              <a:ext uri="{FF2B5EF4-FFF2-40B4-BE49-F238E27FC236}">
-                <a16:creationId xmlns:a16="http://schemas.microsoft.com/office/drawing/2014/main" id="{8AD4C437-1019-7F6A-4470-B3019352B971}"/>
-              </a:ext>
-            </a:extLst>
-          </p:cNvPr>
-          <p:cNvSpPr>
-            <a:spLocks noGrp="1"/>
-          </p:cNvSpPr>
-          <p:nvPr>
-            <p:ph type="dt" sz="half" idx="10"/>
-          </p:nvPr>
-        </p:nvSpPr>
-        <p:spPr>
-          <a:xfrm>
-            <a:off x="4676774" y="6356350"/>
-            <a:ext cx="1695450" cy="365125"/>
-          </a:xfrm>
-        </p:spPr>
-        <p:txBody>
-          <a:bodyPr/>
-          <a:lstStyle/>
-          <a:p>
-            <a:pPr>
-              <a:spcAft>
-                <a:spcPts val="600"/>
-              </a:spcAft>
-            </a:pPr>
-            <a:r>
-              <a:rPr lang="en-US" dirty="0"/>
-              <a:t>2023</a:t>
-            </a:r>
           </a:p>
         </p:txBody>
       </p:sp>
@@ -14175,50 +14191,6 @@
       </p:pic>
       <p:sp>
         <p:nvSpPr>
-          <p:cNvPr id="8" name="Date Placeholder 3">
-            <a:extLst>
-              <a:ext uri="{FF2B5EF4-FFF2-40B4-BE49-F238E27FC236}">
-                <a16:creationId xmlns:a16="http://schemas.microsoft.com/office/drawing/2014/main" id="{D3296170-E790-3E5C-9427-219561C5F5E0}"/>
-              </a:ext>
-            </a:extLst>
-          </p:cNvPr>
-          <p:cNvSpPr>
-            <a:spLocks noGrp="1"/>
-          </p:cNvSpPr>
-          <p:nvPr>
-            <p:ph type="dt" sz="half" idx="10"/>
-          </p:nvPr>
-        </p:nvSpPr>
-        <p:spPr>
-          <a:xfrm>
-            <a:off x="838200" y="6356350"/>
-            <a:ext cx="2743200" cy="365125"/>
-          </a:xfrm>
-        </p:spPr>
-        <p:txBody>
-          <a:bodyPr vert="horz" lIns="91440" tIns="45720" rIns="91440" bIns="45720" rtlCol="0" anchor="ctr">
-            <a:normAutofit/>
-          </a:bodyPr>
-          <a:lstStyle/>
-          <a:p>
-            <a:pPr>
-              <a:spcAft>
-                <a:spcPts val="600"/>
-              </a:spcAft>
-            </a:pPr>
-            <a:r>
-              <a:rPr lang="en-US" kern="1200">
-                <a:latin typeface="+mn-lt"/>
-                <a:ea typeface="+mn-ea"/>
-                <a:cs typeface="+mn-cs"/>
-              </a:rPr>
-              <a:t>2023</a:t>
-            </a:r>
-          </a:p>
-        </p:txBody>
-      </p:sp>
-      <p:sp>
-        <p:nvSpPr>
           <p:cNvPr id="12" name="Slide Number Placeholder 5">
             <a:extLst>
               <a:ext uri="{FF2B5EF4-FFF2-40B4-BE49-F238E27FC236}">
@@ -14542,39 +14514,6 @@
       </p:sp>
       <p:sp>
         <p:nvSpPr>
-          <p:cNvPr id="16" name="Date Placeholder 15">
-            <a:extLst>
-              <a:ext uri="{FF2B5EF4-FFF2-40B4-BE49-F238E27FC236}">
-                <a16:creationId xmlns:a16="http://schemas.microsoft.com/office/drawing/2014/main" id="{24238BD7-9B10-4E64-B1B4-FDE6DD70AA60}"/>
-              </a:ext>
-            </a:extLst>
-          </p:cNvPr>
-          <p:cNvSpPr>
-            <a:spLocks noGrp="1"/>
-          </p:cNvSpPr>
-          <p:nvPr>
-            <p:ph type="dt" sz="half" idx="10"/>
-          </p:nvPr>
-        </p:nvSpPr>
-        <p:spPr>
-          <a:xfrm>
-            <a:off x="838200" y="6356350"/>
-            <a:ext cx="2743200" cy="365125"/>
-          </a:xfrm>
-        </p:spPr>
-        <p:txBody>
-          <a:bodyPr/>
-          <a:lstStyle/>
-          <a:p>
-            <a:r>
-              <a:rPr lang="en-US" dirty="0"/>
-              <a:t>2023</a:t>
-            </a:r>
-          </a:p>
-        </p:txBody>
-      </p:sp>
-      <p:sp>
-        <p:nvSpPr>
           <p:cNvPr id="18" name="Slide Number Placeholder 17">
             <a:extLst>
               <a:ext uri="{FF2B5EF4-FFF2-40B4-BE49-F238E27FC236}">
@@ -14673,50 +14612,6 @@
                 <a:cs typeface="+mj-cs"/>
               </a:rPr>
               <a:t>Present study</a:t>
-            </a:r>
-          </a:p>
-        </p:txBody>
-      </p:sp>
-      <p:sp>
-        <p:nvSpPr>
-          <p:cNvPr id="23" name="Date Placeholder 22">
-            <a:extLst>
-              <a:ext uri="{FF2B5EF4-FFF2-40B4-BE49-F238E27FC236}">
-                <a16:creationId xmlns:a16="http://schemas.microsoft.com/office/drawing/2014/main" id="{637DEDF5-3FCD-4BC2-86A5-7BE2BF01EA38}"/>
-              </a:ext>
-            </a:extLst>
-          </p:cNvPr>
-          <p:cNvSpPr>
-            <a:spLocks noGrp="1"/>
-          </p:cNvSpPr>
-          <p:nvPr>
-            <p:ph type="dt" sz="half" idx="10"/>
-          </p:nvPr>
-        </p:nvSpPr>
-        <p:spPr>
-          <a:xfrm>
-            <a:off x="838200" y="6356350"/>
-            <a:ext cx="2743200" cy="365125"/>
-          </a:xfrm>
-        </p:spPr>
-        <p:txBody>
-          <a:bodyPr vert="horz" lIns="91440" tIns="45720" rIns="91440" bIns="45720" rtlCol="0" anchor="ctr">
-            <a:normAutofit/>
-          </a:bodyPr>
-          <a:lstStyle/>
-          <a:p>
-            <a:pPr>
-              <a:spcAft>
-                <a:spcPts val="600"/>
-              </a:spcAft>
-            </a:pPr>
-            <a:r>
-              <a:rPr lang="en-US" kern="1200">
-                <a:latin typeface="+mn-lt"/>
-                <a:ea typeface="+mn-ea"/>
-                <a:cs typeface="+mn-cs"/>
-              </a:rPr>
-              <a:t>2023</a:t>
             </a:r>
           </a:p>
         </p:txBody>
@@ -15008,39 +14903,6 @@
       </p:sp>
       <p:sp>
         <p:nvSpPr>
-          <p:cNvPr id="9" name="Date Placeholder 8">
-            <a:extLst>
-              <a:ext uri="{FF2B5EF4-FFF2-40B4-BE49-F238E27FC236}">
-                <a16:creationId xmlns:a16="http://schemas.microsoft.com/office/drawing/2014/main" id="{A672774E-BCBF-4B44-9E79-28E9153ABA7E}"/>
-              </a:ext>
-            </a:extLst>
-          </p:cNvPr>
-          <p:cNvSpPr>
-            <a:spLocks noGrp="1"/>
-          </p:cNvSpPr>
-          <p:nvPr>
-            <p:ph type="dt" sz="half" idx="10"/>
-          </p:nvPr>
-        </p:nvSpPr>
-        <p:spPr>
-          <a:xfrm>
-            <a:off x="838200" y="6356350"/>
-            <a:ext cx="2743200" cy="365125"/>
-          </a:xfrm>
-        </p:spPr>
-        <p:txBody>
-          <a:bodyPr/>
-          <a:lstStyle/>
-          <a:p>
-            <a:r>
-              <a:rPr lang="en-US" dirty="0"/>
-              <a:t>2023</a:t>
-            </a:r>
-          </a:p>
-        </p:txBody>
-      </p:sp>
-      <p:sp>
-        <p:nvSpPr>
           <p:cNvPr id="11" name="Slide Number Placeholder 10">
             <a:extLst>
               <a:ext uri="{FF2B5EF4-FFF2-40B4-BE49-F238E27FC236}">
@@ -15152,7 +15014,7 @@
         </p:nvSpPr>
         <p:spPr>
           <a:xfrm>
-            <a:off x="838200" y="365125"/>
+            <a:off x="838200" y="313818"/>
             <a:ext cx="10515600" cy="1325563"/>
           </a:xfrm>
         </p:spPr>
@@ -15163,39 +15025,6 @@
             <a:r>
               <a:rPr lang="en-US" dirty="0"/>
               <a:t>Prior predictive check - easy</a:t>
-            </a:r>
-          </a:p>
-        </p:txBody>
-      </p:sp>
-      <p:sp>
-        <p:nvSpPr>
-          <p:cNvPr id="7" name="Date Placeholder 6">
-            <a:extLst>
-              <a:ext uri="{FF2B5EF4-FFF2-40B4-BE49-F238E27FC236}">
-                <a16:creationId xmlns:a16="http://schemas.microsoft.com/office/drawing/2014/main" id="{E7F1AE66-47AA-4110-86B9-0626D4953989}"/>
-              </a:ext>
-            </a:extLst>
-          </p:cNvPr>
-          <p:cNvSpPr>
-            <a:spLocks noGrp="1"/>
-          </p:cNvSpPr>
-          <p:nvPr>
-            <p:ph type="dt" sz="half" idx="10"/>
-          </p:nvPr>
-        </p:nvSpPr>
-        <p:spPr>
-          <a:xfrm>
-            <a:off x="838200" y="6356350"/>
-            <a:ext cx="2743200" cy="365125"/>
-          </a:xfrm>
-        </p:spPr>
-        <p:txBody>
-          <a:bodyPr/>
-          <a:lstStyle/>
-          <a:p>
-            <a:r>
-              <a:rPr lang="en-US" dirty="0"/>
-              <a:t>2023</a:t>
             </a:r>
           </a:p>
         </p:txBody>
@@ -15257,8 +15086,8 @@
         </p:blipFill>
         <p:spPr>
           <a:xfrm>
-            <a:off x="2067393" y="1690689"/>
-            <a:ext cx="6126480" cy="3860853"/>
+            <a:off x="2381469" y="1900142"/>
+            <a:ext cx="7429061" cy="4681728"/>
           </a:xfrm>
           <a:prstGeom prst="rect">
             <a:avLst/>
@@ -15330,39 +15159,6 @@
       </p:sp>
       <p:sp>
         <p:nvSpPr>
-          <p:cNvPr id="7" name="Date Placeholder 6">
-            <a:extLst>
-              <a:ext uri="{FF2B5EF4-FFF2-40B4-BE49-F238E27FC236}">
-                <a16:creationId xmlns:a16="http://schemas.microsoft.com/office/drawing/2014/main" id="{E7F1AE66-47AA-4110-86B9-0626D4953989}"/>
-              </a:ext>
-            </a:extLst>
-          </p:cNvPr>
-          <p:cNvSpPr>
-            <a:spLocks noGrp="1"/>
-          </p:cNvSpPr>
-          <p:nvPr>
-            <p:ph type="dt" sz="half" idx="10"/>
-          </p:nvPr>
-        </p:nvSpPr>
-        <p:spPr>
-          <a:xfrm>
-            <a:off x="838200" y="6356350"/>
-            <a:ext cx="2743200" cy="365125"/>
-          </a:xfrm>
-        </p:spPr>
-        <p:txBody>
-          <a:bodyPr/>
-          <a:lstStyle/>
-          <a:p>
-            <a:r>
-              <a:rPr lang="en-US" dirty="0"/>
-              <a:t>2023</a:t>
-            </a:r>
-          </a:p>
-        </p:txBody>
-      </p:sp>
-      <p:sp>
-        <p:nvSpPr>
           <p:cNvPr id="9" name="Slide Number Placeholder 8">
             <a:extLst>
               <a:ext uri="{FF2B5EF4-FFF2-40B4-BE49-F238E27FC236}">
@@ -15490,59 +15286,6 @@
       </p:sp>
       <p:sp>
         <p:nvSpPr>
-          <p:cNvPr id="3" name="Text Placeholder 2">
-            <a:extLst>
-              <a:ext uri="{FF2B5EF4-FFF2-40B4-BE49-F238E27FC236}">
-                <a16:creationId xmlns:a16="http://schemas.microsoft.com/office/drawing/2014/main" id="{494EE336-62F1-C596-7382-7A2A3B464295}"/>
-              </a:ext>
-            </a:extLst>
-          </p:cNvPr>
-          <p:cNvSpPr>
-            <a:spLocks noGrp="1"/>
-          </p:cNvSpPr>
-          <p:nvPr>
-            <p:ph type="body" idx="1"/>
-          </p:nvPr>
-        </p:nvSpPr>
-        <p:spPr/>
-        <p:txBody>
-          <a:bodyPr/>
-          <a:lstStyle/>
-          <a:p>
-            <a:endParaRPr lang="en-US"/>
-          </a:p>
-        </p:txBody>
-      </p:sp>
-      <p:sp>
-        <p:nvSpPr>
-          <p:cNvPr id="4" name="Date Placeholder 3">
-            <a:extLst>
-              <a:ext uri="{FF2B5EF4-FFF2-40B4-BE49-F238E27FC236}">
-                <a16:creationId xmlns:a16="http://schemas.microsoft.com/office/drawing/2014/main" id="{4C65F5D8-1294-DB56-B57D-E8D27C549962}"/>
-              </a:ext>
-            </a:extLst>
-          </p:cNvPr>
-          <p:cNvSpPr>
-            <a:spLocks noGrp="1"/>
-          </p:cNvSpPr>
-          <p:nvPr>
-            <p:ph type="dt" sz="half" idx="10"/>
-          </p:nvPr>
-        </p:nvSpPr>
-        <p:spPr/>
-        <p:txBody>
-          <a:bodyPr/>
-          <a:lstStyle/>
-          <a:p>
-            <a:r>
-              <a:rPr lang="en-US" dirty="0"/>
-              <a:t>2023</a:t>
-            </a:r>
-          </a:p>
-        </p:txBody>
-      </p:sp>
-      <p:sp>
-        <p:nvSpPr>
           <p:cNvPr id="6" name="Slide Number Placeholder 5">
             <a:extLst>
               <a:ext uri="{FF2B5EF4-FFF2-40B4-BE49-F238E27FC236}">
@@ -15636,39 +15379,6 @@
       </p:sp>
       <p:sp>
         <p:nvSpPr>
-          <p:cNvPr id="7" name="Date Placeholder 6">
-            <a:extLst>
-              <a:ext uri="{FF2B5EF4-FFF2-40B4-BE49-F238E27FC236}">
-                <a16:creationId xmlns:a16="http://schemas.microsoft.com/office/drawing/2014/main" id="{B2A46C4A-D036-4440-BB64-6754F4FF27C1}"/>
-              </a:ext>
-            </a:extLst>
-          </p:cNvPr>
-          <p:cNvSpPr>
-            <a:spLocks noGrp="1"/>
-          </p:cNvSpPr>
-          <p:nvPr>
-            <p:ph type="dt" sz="half" idx="10"/>
-          </p:nvPr>
-        </p:nvSpPr>
-        <p:spPr>
-          <a:xfrm>
-            <a:off x="838200" y="6356350"/>
-            <a:ext cx="2743200" cy="365125"/>
-          </a:xfrm>
-        </p:spPr>
-        <p:txBody>
-          <a:bodyPr/>
-          <a:lstStyle/>
-          <a:p>
-            <a:r>
-              <a:rPr lang="en-US" dirty="0"/>
-              <a:t>20XX</a:t>
-            </a:r>
-          </a:p>
-        </p:txBody>
-      </p:sp>
-      <p:sp>
-        <p:nvSpPr>
           <p:cNvPr id="9" name="Slide Number Placeholder 8">
             <a:extLst>
               <a:ext uri="{FF2B5EF4-FFF2-40B4-BE49-F238E27FC236}">
@@ -15897,72 +15607,6 @@
       </p:sp>
       <p:sp>
         <p:nvSpPr>
-          <p:cNvPr id="6" name="Date Placeholder 5">
-            <a:extLst>
-              <a:ext uri="{FF2B5EF4-FFF2-40B4-BE49-F238E27FC236}">
-                <a16:creationId xmlns:a16="http://schemas.microsoft.com/office/drawing/2014/main" id="{3627CC26-34EF-4BB9-B289-9EC56B07D1E6}"/>
-              </a:ext>
-            </a:extLst>
-          </p:cNvPr>
-          <p:cNvSpPr>
-            <a:spLocks noGrp="1"/>
-          </p:cNvSpPr>
-          <p:nvPr>
-            <p:ph type="dt" sz="half" idx="10"/>
-          </p:nvPr>
-        </p:nvSpPr>
-        <p:spPr>
-          <a:xfrm>
-            <a:off x="838200" y="6356350"/>
-            <a:ext cx="2743200" cy="365125"/>
-          </a:xfrm>
-        </p:spPr>
-        <p:txBody>
-          <a:bodyPr/>
-          <a:lstStyle/>
-          <a:p>
-            <a:r>
-              <a:rPr lang="en-US" dirty="0"/>
-              <a:t>20XX</a:t>
-            </a:r>
-          </a:p>
-        </p:txBody>
-      </p:sp>
-      <p:sp>
-        <p:nvSpPr>
-          <p:cNvPr id="7" name="Footer Placeholder 6">
-            <a:extLst>
-              <a:ext uri="{FF2B5EF4-FFF2-40B4-BE49-F238E27FC236}">
-                <a16:creationId xmlns:a16="http://schemas.microsoft.com/office/drawing/2014/main" id="{4E98E6AD-9D37-499C-898E-ED12AC36D31D}"/>
-              </a:ext>
-            </a:extLst>
-          </p:cNvPr>
-          <p:cNvSpPr>
-            <a:spLocks noGrp="1"/>
-          </p:cNvSpPr>
-          <p:nvPr>
-            <p:ph type="ftr" sz="quarter" idx="11"/>
-          </p:nvPr>
-        </p:nvSpPr>
-        <p:spPr>
-          <a:xfrm>
-            <a:off x="4038600" y="6356350"/>
-            <a:ext cx="4114800" cy="365125"/>
-          </a:xfrm>
-        </p:spPr>
-        <p:txBody>
-          <a:bodyPr/>
-          <a:lstStyle/>
-          <a:p>
-            <a:r>
-              <a:rPr lang="en-US" dirty="0"/>
-              <a:t>PRESENTATION TITLE</a:t>
-            </a:r>
-          </a:p>
-        </p:txBody>
-      </p:sp>
-      <p:sp>
-        <p:nvSpPr>
           <p:cNvPr id="8" name="Slide Number Placeholder 7">
             <a:extLst>
               <a:ext uri="{FF2B5EF4-FFF2-40B4-BE49-F238E27FC236}">
@@ -16018,7 +15662,7 @@
         </p:blipFill>
         <p:spPr>
           <a:xfrm>
-            <a:off x="619626" y="1943098"/>
+            <a:off x="666086" y="2412140"/>
             <a:ext cx="10859827" cy="3222757"/>
           </a:xfrm>
           <a:prstGeom prst="rect">
@@ -16125,35 +15769,7 @@
             </a:r>
             <a:r>
               <a:rPr lang="en-US" sz="2000" dirty="0"/>
-              <a:t> et. al., 2017</a:t>
-            </a:r>
-          </a:p>
-        </p:txBody>
-      </p:sp>
-      <p:sp>
-        <p:nvSpPr>
-          <p:cNvPr id="4" name="Date Placeholder 3">
-            <a:extLst>
-              <a:ext uri="{FF2B5EF4-FFF2-40B4-BE49-F238E27FC236}">
-                <a16:creationId xmlns:a16="http://schemas.microsoft.com/office/drawing/2014/main" id="{9FEDF263-D1D4-DD27-DF04-EF8ACAA2C88A}"/>
-              </a:ext>
-            </a:extLst>
-          </p:cNvPr>
-          <p:cNvSpPr>
-            <a:spLocks noGrp="1"/>
-          </p:cNvSpPr>
-          <p:nvPr>
-            <p:ph type="dt" sz="half" idx="10"/>
-          </p:nvPr>
-        </p:nvSpPr>
-        <p:spPr/>
-        <p:txBody>
-          <a:bodyPr/>
-          <a:lstStyle/>
-          <a:p>
-            <a:r>
-              <a:rPr lang="en-US" dirty="0"/>
-              <a:t>2023</a:t>
+              <a:t> et al. (2017)</a:t>
             </a:r>
           </a:p>
         </p:txBody>
@@ -16253,72 +15869,6 @@
       </p:sp>
       <p:sp>
         <p:nvSpPr>
-          <p:cNvPr id="6" name="Date Placeholder 5">
-            <a:extLst>
-              <a:ext uri="{FF2B5EF4-FFF2-40B4-BE49-F238E27FC236}">
-                <a16:creationId xmlns:a16="http://schemas.microsoft.com/office/drawing/2014/main" id="{3627CC26-34EF-4BB9-B289-9EC56B07D1E6}"/>
-              </a:ext>
-            </a:extLst>
-          </p:cNvPr>
-          <p:cNvSpPr>
-            <a:spLocks noGrp="1"/>
-          </p:cNvSpPr>
-          <p:nvPr>
-            <p:ph type="dt" sz="half" idx="10"/>
-          </p:nvPr>
-        </p:nvSpPr>
-        <p:spPr>
-          <a:xfrm>
-            <a:off x="838200" y="6356350"/>
-            <a:ext cx="2743200" cy="365125"/>
-          </a:xfrm>
-        </p:spPr>
-        <p:txBody>
-          <a:bodyPr/>
-          <a:lstStyle/>
-          <a:p>
-            <a:r>
-              <a:rPr lang="en-US" dirty="0"/>
-              <a:t>20XX</a:t>
-            </a:r>
-          </a:p>
-        </p:txBody>
-      </p:sp>
-      <p:sp>
-        <p:nvSpPr>
-          <p:cNvPr id="7" name="Footer Placeholder 6">
-            <a:extLst>
-              <a:ext uri="{FF2B5EF4-FFF2-40B4-BE49-F238E27FC236}">
-                <a16:creationId xmlns:a16="http://schemas.microsoft.com/office/drawing/2014/main" id="{4E98E6AD-9D37-499C-898E-ED12AC36D31D}"/>
-              </a:ext>
-            </a:extLst>
-          </p:cNvPr>
-          <p:cNvSpPr>
-            <a:spLocks noGrp="1"/>
-          </p:cNvSpPr>
-          <p:nvPr>
-            <p:ph type="ftr" sz="quarter" idx="11"/>
-          </p:nvPr>
-        </p:nvSpPr>
-        <p:spPr>
-          <a:xfrm>
-            <a:off x="4038600" y="6356350"/>
-            <a:ext cx="4114800" cy="365125"/>
-          </a:xfrm>
-        </p:spPr>
-        <p:txBody>
-          <a:bodyPr/>
-          <a:lstStyle/>
-          <a:p>
-            <a:r>
-              <a:rPr lang="en-US" dirty="0"/>
-              <a:t>PRESENTATION TITLE</a:t>
-            </a:r>
-          </a:p>
-        </p:txBody>
-      </p:sp>
-      <p:sp>
-        <p:nvSpPr>
           <p:cNvPr id="8" name="Slide Number Placeholder 7">
             <a:extLst>
               <a:ext uri="{FF2B5EF4-FFF2-40B4-BE49-F238E27FC236}">
@@ -16374,8 +15924,8 @@
         </p:blipFill>
         <p:spPr>
           <a:xfrm>
-            <a:off x="838200" y="2205378"/>
-            <a:ext cx="9727532" cy="2893317"/>
+            <a:off x="685274" y="2414175"/>
+            <a:ext cx="10821452" cy="3218688"/>
           </a:xfrm>
           <a:prstGeom prst="rect">
             <a:avLst/>
@@ -16447,39 +15997,6 @@
       </p:sp>
       <p:sp>
         <p:nvSpPr>
-          <p:cNvPr id="9" name="Date Placeholder 8">
-            <a:extLst>
-              <a:ext uri="{FF2B5EF4-FFF2-40B4-BE49-F238E27FC236}">
-                <a16:creationId xmlns:a16="http://schemas.microsoft.com/office/drawing/2014/main" id="{B86AD343-7149-4E7C-BD28-3080F25980CF}"/>
-              </a:ext>
-            </a:extLst>
-          </p:cNvPr>
-          <p:cNvSpPr>
-            <a:spLocks noGrp="1"/>
-          </p:cNvSpPr>
-          <p:nvPr>
-            <p:ph type="dt" sz="half" idx="10"/>
-          </p:nvPr>
-        </p:nvSpPr>
-        <p:spPr>
-          <a:xfrm>
-            <a:off x="838200" y="6356350"/>
-            <a:ext cx="2743200" cy="365125"/>
-          </a:xfrm>
-        </p:spPr>
-        <p:txBody>
-          <a:bodyPr/>
-          <a:lstStyle/>
-          <a:p>
-            <a:r>
-              <a:rPr lang="en-US" dirty="0"/>
-              <a:t>20XX</a:t>
-            </a:r>
-          </a:p>
-        </p:txBody>
-      </p:sp>
-      <p:sp>
-        <p:nvSpPr>
           <p:cNvPr id="11" name="Slide Number Placeholder 10">
             <a:extLst>
               <a:ext uri="{FF2B5EF4-FFF2-40B4-BE49-F238E27FC236}">
@@ -16608,39 +16125,6 @@
       </p:sp>
       <p:sp>
         <p:nvSpPr>
-          <p:cNvPr id="9" name="Date Placeholder 8">
-            <a:extLst>
-              <a:ext uri="{FF2B5EF4-FFF2-40B4-BE49-F238E27FC236}">
-                <a16:creationId xmlns:a16="http://schemas.microsoft.com/office/drawing/2014/main" id="{B86AD343-7149-4E7C-BD28-3080F25980CF}"/>
-              </a:ext>
-            </a:extLst>
-          </p:cNvPr>
-          <p:cNvSpPr>
-            <a:spLocks noGrp="1"/>
-          </p:cNvSpPr>
-          <p:nvPr>
-            <p:ph type="dt" sz="half" idx="10"/>
-          </p:nvPr>
-        </p:nvSpPr>
-        <p:spPr>
-          <a:xfrm>
-            <a:off x="838200" y="6356350"/>
-            <a:ext cx="2743200" cy="365125"/>
-          </a:xfrm>
-        </p:spPr>
-        <p:txBody>
-          <a:bodyPr/>
-          <a:lstStyle/>
-          <a:p>
-            <a:r>
-              <a:rPr lang="en-US" dirty="0"/>
-              <a:t>2023</a:t>
-            </a:r>
-          </a:p>
-        </p:txBody>
-      </p:sp>
-      <p:sp>
-        <p:nvSpPr>
           <p:cNvPr id="11" name="Slide Number Placeholder 10">
             <a:extLst>
               <a:ext uri="{FF2B5EF4-FFF2-40B4-BE49-F238E27FC236}">
@@ -16896,34 +16380,6 @@
       </p:sp>
       <p:sp>
         <p:nvSpPr>
-          <p:cNvPr id="4" name="Date Placeholder 3">
-            <a:extLst>
-              <a:ext uri="{FF2B5EF4-FFF2-40B4-BE49-F238E27FC236}">
-                <a16:creationId xmlns:a16="http://schemas.microsoft.com/office/drawing/2014/main" id="{BB5F8B01-9EE2-9220-96B5-6622A283405D}"/>
-              </a:ext>
-            </a:extLst>
-          </p:cNvPr>
-          <p:cNvSpPr>
-            <a:spLocks noGrp="1"/>
-          </p:cNvSpPr>
-          <p:nvPr>
-            <p:ph type="dt" sz="half" idx="10"/>
-          </p:nvPr>
-        </p:nvSpPr>
-        <p:spPr/>
-        <p:txBody>
-          <a:bodyPr/>
-          <a:lstStyle/>
-          <a:p>
-            <a:r>
-              <a:rPr lang="en-US" dirty="0"/>
-              <a:t>2023</a:t>
-            </a:r>
-          </a:p>
-        </p:txBody>
-      </p:sp>
-      <p:sp>
-        <p:nvSpPr>
           <p:cNvPr id="6" name="Slide Number Placeholder 5">
             <a:extLst>
               <a:ext uri="{FF2B5EF4-FFF2-40B4-BE49-F238E27FC236}">
@@ -17200,34 +16656,6 @@
       </p:sp>
       <p:sp>
         <p:nvSpPr>
-          <p:cNvPr id="4" name="Date Placeholder 3">
-            <a:extLst>
-              <a:ext uri="{FF2B5EF4-FFF2-40B4-BE49-F238E27FC236}">
-                <a16:creationId xmlns:a16="http://schemas.microsoft.com/office/drawing/2014/main" id="{BB5F8B01-9EE2-9220-96B5-6622A283405D}"/>
-              </a:ext>
-            </a:extLst>
-          </p:cNvPr>
-          <p:cNvSpPr>
-            <a:spLocks noGrp="1"/>
-          </p:cNvSpPr>
-          <p:nvPr>
-            <p:ph type="dt" sz="half" idx="10"/>
-          </p:nvPr>
-        </p:nvSpPr>
-        <p:spPr/>
-        <p:txBody>
-          <a:bodyPr/>
-          <a:lstStyle/>
-          <a:p>
-            <a:r>
-              <a:rPr lang="en-US" dirty="0"/>
-              <a:t>2023</a:t>
-            </a:r>
-          </a:p>
-        </p:txBody>
-      </p:sp>
-      <p:sp>
-        <p:nvSpPr>
           <p:cNvPr id="5" name="Footer Placeholder 4">
             <a:extLst>
               <a:ext uri="{FF2B5EF4-FFF2-40B4-BE49-F238E27FC236}">
@@ -17764,34 +17192,6 @@
       </p:sp>
       <p:sp>
         <p:nvSpPr>
-          <p:cNvPr id="4" name="Date Placeholder 3">
-            <a:extLst>
-              <a:ext uri="{FF2B5EF4-FFF2-40B4-BE49-F238E27FC236}">
-                <a16:creationId xmlns:a16="http://schemas.microsoft.com/office/drawing/2014/main" id="{F0FF605B-40D1-EDD3-D30B-FA1482FDF9AF}"/>
-              </a:ext>
-            </a:extLst>
-          </p:cNvPr>
-          <p:cNvSpPr>
-            <a:spLocks noGrp="1"/>
-          </p:cNvSpPr>
-          <p:nvPr>
-            <p:ph type="dt" sz="half" idx="10"/>
-          </p:nvPr>
-        </p:nvSpPr>
-        <p:spPr/>
-        <p:txBody>
-          <a:bodyPr/>
-          <a:lstStyle/>
-          <a:p>
-            <a:r>
-              <a:rPr lang="en-US" dirty="0"/>
-              <a:t>2023</a:t>
-            </a:r>
-          </a:p>
-        </p:txBody>
-      </p:sp>
-      <p:sp>
-        <p:nvSpPr>
           <p:cNvPr id="6" name="Slide Number Placeholder 5">
             <a:extLst>
               <a:ext uri="{FF2B5EF4-FFF2-40B4-BE49-F238E27FC236}">
@@ -17854,7 +17254,7 @@
             </a:pPr>
             <a:r>
               <a:rPr lang="en-US" dirty="0"/>
-              <a:t>The goal of this experiment was to 1) show whether characteristics of hand movements could be used as objective measurement of decision confidence and 2) study the relationship between certainty and confidence.</a:t>
+              <a:t>The goals of this experiment were to 1) show whether characteristics of hand movements could be used as objective measurement of decision confidence and 2) study the relationship between certainty and confidence.</a:t>
             </a:r>
           </a:p>
           <a:p>
@@ -17864,8 +17264,13 @@
             </a:pPr>
             <a:r>
               <a:rPr lang="en-US" dirty="0"/>
-              <a:t>In total there were 27 participants and 16 unique items they were tested</a:t>
-            </a:r>
+              <a:t>In total there were 27 participants and 16 </a:t>
+            </a:r>
+            <a:r>
+              <a:rPr lang="en-US"/>
+              <a:t>unique items</a:t>
+            </a:r>
+            <a:endParaRPr lang="en-US" dirty="0"/>
           </a:p>
           <a:p>
             <a:pPr marL="285750" indent="-285750">
@@ -17873,16 +17278,23 @@
               <a:buChar char="•"/>
             </a:pPr>
             <a:r>
+              <a:rPr lang="en-US" b="1" dirty="0"/>
+              <a:t>Random Dot </a:t>
+            </a:r>
+            <a:r>
+              <a:rPr lang="en-US" b="1" dirty="0" err="1"/>
+              <a:t>Kinematogram</a:t>
+            </a:r>
+            <a:r>
+              <a:rPr lang="en-US" b="1" dirty="0"/>
+              <a:t> (RDK)</a:t>
+            </a:r>
+          </a:p>
+          <a:p>
+            <a:pPr lvl="1"/>
+            <a:r>
               <a:rPr lang="en-US" dirty="0"/>
-              <a:t>Random Dot </a:t>
-            </a:r>
-            <a:r>
-              <a:rPr lang="en-US" dirty="0" err="1"/>
-              <a:t>Kinematogram</a:t>
-            </a:r>
-            <a:r>
-              <a:rPr lang="en-US" dirty="0"/>
-              <a:t> – Display containing a dense pattern of random black and white dots that moves in one direction during subsequent frames. Participants report direction of this movement according to coherence level.</a:t>
+              <a:t>Display containing a dense pattern of random black and white dots that moves in one direction during subsequent frames. (See figure below)</a:t>
             </a:r>
           </a:p>
         </p:txBody>
@@ -17909,8 +17321,8 @@
         </p:blipFill>
         <p:spPr>
           <a:xfrm>
-            <a:off x="3392301" y="4511770"/>
-            <a:ext cx="5407398" cy="1721250"/>
+            <a:off x="2056137" y="4093223"/>
+            <a:ext cx="6748613" cy="2148178"/>
           </a:xfrm>
           <a:prstGeom prst="rect">
             <a:avLst/>
@@ -18019,34 +17431,6 @@
           </a:xfrm>
         </p:spPr>
       </p:pic>
-      <p:sp>
-        <p:nvSpPr>
-          <p:cNvPr id="7" name="Date Placeholder 6">
-            <a:extLst>
-              <a:ext uri="{FF2B5EF4-FFF2-40B4-BE49-F238E27FC236}">
-                <a16:creationId xmlns:a16="http://schemas.microsoft.com/office/drawing/2014/main" id="{DD49D58D-2169-A256-B91C-D0BC650692F0}"/>
-              </a:ext>
-            </a:extLst>
-          </p:cNvPr>
-          <p:cNvSpPr>
-            <a:spLocks noGrp="1"/>
-          </p:cNvSpPr>
-          <p:nvPr>
-            <p:ph type="dt" sz="half" idx="10"/>
-          </p:nvPr>
-        </p:nvSpPr>
-        <p:spPr/>
-        <p:txBody>
-          <a:bodyPr/>
-          <a:lstStyle/>
-          <a:p>
-            <a:r>
-              <a:rPr lang="en-US" dirty="0"/>
-              <a:t>2023</a:t>
-            </a:r>
-          </a:p>
-        </p:txBody>
-      </p:sp>
       <p:sp>
         <p:nvSpPr>
           <p:cNvPr id="9" name="Slide Number Placeholder 8">
@@ -18277,39 +17661,6 @@
       </p:sp>
       <p:sp>
         <p:nvSpPr>
-          <p:cNvPr id="4" name="Date Placeholder 3">
-            <a:extLst>
-              <a:ext uri="{FF2B5EF4-FFF2-40B4-BE49-F238E27FC236}">
-                <a16:creationId xmlns:a16="http://schemas.microsoft.com/office/drawing/2014/main" id="{70E12647-CCB2-45E2-A9CB-A868F490497E}"/>
-              </a:ext>
-            </a:extLst>
-          </p:cNvPr>
-          <p:cNvSpPr>
-            <a:spLocks noGrp="1"/>
-          </p:cNvSpPr>
-          <p:nvPr>
-            <p:ph type="dt" sz="half" idx="10"/>
-          </p:nvPr>
-        </p:nvSpPr>
-        <p:spPr>
-          <a:xfrm>
-            <a:off x="838200" y="6356350"/>
-            <a:ext cx="1219200" cy="365125"/>
-          </a:xfrm>
-        </p:spPr>
-        <p:txBody>
-          <a:bodyPr/>
-          <a:lstStyle/>
-          <a:p>
-            <a:r>
-              <a:rPr lang="en-US" dirty="0"/>
-              <a:t>2023</a:t>
-            </a:r>
-          </a:p>
-        </p:txBody>
-      </p:sp>
-      <p:sp>
-        <p:nvSpPr>
           <p:cNvPr id="6" name="Slide Number Placeholder 5">
             <a:extLst>
               <a:ext uri="{FF2B5EF4-FFF2-40B4-BE49-F238E27FC236}">
@@ -18362,7 +17713,7 @@
         <p:spPr>
           <a:xfrm>
             <a:off x="1362074" y="2580678"/>
-            <a:ext cx="9715053" cy="3709658"/>
+            <a:ext cx="9715053" cy="2456100"/>
           </a:xfrm>
         </p:spPr>
         <p:txBody>
@@ -18399,7 +17750,7 @@
                 <a:effectLst/>
                 <a:latin typeface="Georgia" panose="02040502050405020303" pitchFamily="18" charset="0"/>
               </a:rPr>
-              <a:t>Proposed by </a:t>
+              <a:t>Published by </a:t>
             </a:r>
             <a:r>
               <a:rPr lang="en-US" sz="1800" b="0" i="0" dirty="0" err="1">
@@ -18419,7 +17770,7 @@
                 <a:effectLst/>
                 <a:latin typeface="Georgia" panose="02040502050405020303" pitchFamily="18" charset="0"/>
               </a:rPr>
-              <a:t> et al. in 2007</a:t>
+              <a:t>, et al. in 2007</a:t>
             </a:r>
           </a:p>
           <a:p>
@@ -18445,16 +17796,18 @@
             </a:pPr>
             <a:r>
               <a:rPr lang="en-US" sz="1800" dirty="0">
-                <a:latin typeface="TimesNewRomanPS"/>
+                <a:latin typeface="Georgia" panose="02040502050405020303" pitchFamily="18" charset="0"/>
               </a:rPr>
               <a:t>I</a:t>
             </a:r>
             <a:r>
-              <a:rPr lang="en-US" sz="1800" b="0" i="0" u="none" strike="noStrike" baseline="0" dirty="0">
-                <a:latin typeface="TimesNewRomanPS"/>
+              <a:rPr lang="en-US" sz="1800" b="0" i="0" u="none" strike="noStrike" dirty="0">
+                <a:latin typeface="Georgia" panose="02040502050405020303" pitchFamily="18" charset="0"/>
               </a:rPr>
               <a:t>t does not require a parameter fitting routine</a:t>
             </a:r>
+          </a:p>
+          <a:p>
             <a:endParaRPr lang="en-US" sz="1800" dirty="0">
               <a:solidFill>
                 <a:srgbClr val="333333"/>
@@ -19491,34 +18844,6 @@
             <a:r>
               <a:rPr lang="en-US" dirty="0"/>
               <a:t>Item performance – Response Accuracy</a:t>
-            </a:r>
-          </a:p>
-        </p:txBody>
-      </p:sp>
-      <p:sp>
-        <p:nvSpPr>
-          <p:cNvPr id="4" name="Date Placeholder 3">
-            <a:extLst>
-              <a:ext uri="{FF2B5EF4-FFF2-40B4-BE49-F238E27FC236}">
-                <a16:creationId xmlns:a16="http://schemas.microsoft.com/office/drawing/2014/main" id="{E143FBCB-9018-E6A5-B631-A5D7D29D806C}"/>
-              </a:ext>
-            </a:extLst>
-          </p:cNvPr>
-          <p:cNvSpPr>
-            <a:spLocks noGrp="1"/>
-          </p:cNvSpPr>
-          <p:nvPr>
-            <p:ph type="dt" sz="half" idx="10"/>
-          </p:nvPr>
-        </p:nvSpPr>
-        <p:spPr/>
-        <p:txBody>
-          <a:bodyPr/>
-          <a:lstStyle/>
-          <a:p>
-            <a:r>
-              <a:rPr lang="en-US" dirty="0"/>
-              <a:t>2023</a:t>
             </a:r>
           </a:p>
         </p:txBody>
@@ -20790,11 +20115,18 @@
 <file path=customXml/itemProps2.xml><?xml version="1.0" encoding="utf-8"?>
 <ds:datastoreItem xmlns:ds="http://schemas.openxmlformats.org/officeDocument/2006/customXml" ds:itemID="{62C4DF17-F044-499E-9F05-A29D5AD84F26}">
   <ds:schemaRefs>
+    <ds:schemaRef ds:uri="http://purl.org/dc/elements/1.1/"/>
     <ds:schemaRef ds:uri="http://schemas.microsoft.com/office/2006/metadata/properties"/>
+    <ds:schemaRef ds:uri="71af3243-3dd4-4a8d-8c0d-dd76da1f02a5"/>
+    <ds:schemaRef ds:uri="http://purl.org/dc/dcmitype/"/>
+    <ds:schemaRef ds:uri="http://schemas.microsoft.com/office/2006/documentManagement/types"/>
+    <ds:schemaRef ds:uri="http://purl.org/dc/terms/"/>
     <ds:schemaRef ds:uri="http://schemas.microsoft.com/office/infopath/2007/PartnerControls"/>
+    <ds:schemaRef ds:uri="http://schemas.openxmlformats.org/package/2006/metadata/core-properties"/>
+    <ds:schemaRef ds:uri="230e9df3-be65-4c73-a93b-d1236ebd677e"/>
+    <ds:schemaRef ds:uri="16c05727-aa75-4e4a-9b5f-8a80a1165891"/>
     <ds:schemaRef ds:uri="http://schemas.microsoft.com/sharepoint/v3"/>
-    <ds:schemaRef ds:uri="71af3243-3dd4-4a8d-8c0d-dd76da1f02a5"/>
-    <ds:schemaRef ds:uri="230e9df3-be65-4c73-a93b-d1236ebd677e"/>
+    <ds:schemaRef ds:uri="http://www.w3.org/XML/1998/namespace"/>
   </ds:schemaRefs>
 </ds:datastoreItem>
 </file>

</xml_diff>